<commit_message>
error signal final update
</commit_message>
<xml_diff>
--- a/Figures/Final/Figure Edits.pptx
+++ b/Figures/Final/Figure Edits.pptx
@@ -271,7 +271,7 @@
           <a:p>
             <a:fld id="{89ACA6FD-605E-624E-819A-5AEF303D7F38}" type="datetimeFigureOut">
               <a:rPr lang="en-US" smtClean="0"/>
-              <a:t>4/27/25</a:t>
+              <a:t>4/29/25</a:t>
             </a:fld>
             <a:endParaRPr lang="en-US"/>
           </a:p>
@@ -469,7 +469,7 @@
           <a:p>
             <a:fld id="{89ACA6FD-605E-624E-819A-5AEF303D7F38}" type="datetimeFigureOut">
               <a:rPr lang="en-US" smtClean="0"/>
-              <a:t>4/27/25</a:t>
+              <a:t>4/29/25</a:t>
             </a:fld>
             <a:endParaRPr lang="en-US"/>
           </a:p>
@@ -677,7 +677,7 @@
           <a:p>
             <a:fld id="{89ACA6FD-605E-624E-819A-5AEF303D7F38}" type="datetimeFigureOut">
               <a:rPr lang="en-US" smtClean="0"/>
-              <a:t>4/27/25</a:t>
+              <a:t>4/29/25</a:t>
             </a:fld>
             <a:endParaRPr lang="en-US"/>
           </a:p>
@@ -875,7 +875,7 @@
           <a:p>
             <a:fld id="{89ACA6FD-605E-624E-819A-5AEF303D7F38}" type="datetimeFigureOut">
               <a:rPr lang="en-US" smtClean="0"/>
-              <a:t>4/27/25</a:t>
+              <a:t>4/29/25</a:t>
             </a:fld>
             <a:endParaRPr lang="en-US"/>
           </a:p>
@@ -1150,7 +1150,7 @@
           <a:p>
             <a:fld id="{89ACA6FD-605E-624E-819A-5AEF303D7F38}" type="datetimeFigureOut">
               <a:rPr lang="en-US" smtClean="0"/>
-              <a:t>4/27/25</a:t>
+              <a:t>4/29/25</a:t>
             </a:fld>
             <a:endParaRPr lang="en-US"/>
           </a:p>
@@ -1415,7 +1415,7 @@
           <a:p>
             <a:fld id="{89ACA6FD-605E-624E-819A-5AEF303D7F38}" type="datetimeFigureOut">
               <a:rPr lang="en-US" smtClean="0"/>
-              <a:t>4/27/25</a:t>
+              <a:t>4/29/25</a:t>
             </a:fld>
             <a:endParaRPr lang="en-US"/>
           </a:p>
@@ -1827,7 +1827,7 @@
           <a:p>
             <a:fld id="{89ACA6FD-605E-624E-819A-5AEF303D7F38}" type="datetimeFigureOut">
               <a:rPr lang="en-US" smtClean="0"/>
-              <a:t>4/27/25</a:t>
+              <a:t>4/29/25</a:t>
             </a:fld>
             <a:endParaRPr lang="en-US"/>
           </a:p>
@@ -1968,7 +1968,7 @@
           <a:p>
             <a:fld id="{89ACA6FD-605E-624E-819A-5AEF303D7F38}" type="datetimeFigureOut">
               <a:rPr lang="en-US" smtClean="0"/>
-              <a:t>4/27/25</a:t>
+              <a:t>4/29/25</a:t>
             </a:fld>
             <a:endParaRPr lang="en-US"/>
           </a:p>
@@ -2081,7 +2081,7 @@
           <a:p>
             <a:fld id="{89ACA6FD-605E-624E-819A-5AEF303D7F38}" type="datetimeFigureOut">
               <a:rPr lang="en-US" smtClean="0"/>
-              <a:t>4/27/25</a:t>
+              <a:t>4/29/25</a:t>
             </a:fld>
             <a:endParaRPr lang="en-US"/>
           </a:p>
@@ -2392,7 +2392,7 @@
           <a:p>
             <a:fld id="{89ACA6FD-605E-624E-819A-5AEF303D7F38}" type="datetimeFigureOut">
               <a:rPr lang="en-US" smtClean="0"/>
-              <a:t>4/27/25</a:t>
+              <a:t>4/29/25</a:t>
             </a:fld>
             <a:endParaRPr lang="en-US"/>
           </a:p>
@@ -2680,7 +2680,7 @@
           <a:p>
             <a:fld id="{89ACA6FD-605E-624E-819A-5AEF303D7F38}" type="datetimeFigureOut">
               <a:rPr lang="en-US" smtClean="0"/>
-              <a:t>4/27/25</a:t>
+              <a:t>4/29/25</a:t>
             </a:fld>
             <a:endParaRPr lang="en-US"/>
           </a:p>
@@ -2921,7 +2921,7 @@
           <a:p>
             <a:fld id="{89ACA6FD-605E-624E-819A-5AEF303D7F38}" type="datetimeFigureOut">
               <a:rPr lang="en-US" smtClean="0"/>
-              <a:t>4/27/25</a:t>
+              <a:t>4/29/25</a:t>
             </a:fld>
             <a:endParaRPr lang="en-US"/>
           </a:p>
@@ -5036,10 +5036,10 @@
       </p:sp>
       <p:grpSp>
         <p:nvGrpSpPr>
-          <p:cNvPr id="19" name="Group 18">
+          <p:cNvPr id="8" name="Group 7">
             <a:extLst>
               <a:ext uri="{FF2B5EF4-FFF2-40B4-BE49-F238E27FC236}">
-                <a16:creationId xmlns:a16="http://schemas.microsoft.com/office/drawing/2014/main" id="{A137D02C-7628-19E1-0CE1-72A079C3572A}"/>
+                <a16:creationId xmlns:a16="http://schemas.microsoft.com/office/drawing/2014/main" id="{0CDAB640-0062-200E-033B-3582A5F049F1}"/>
               </a:ext>
             </a:extLst>
           </p:cNvPr>
@@ -5048,18 +5048,18 @@
         </p:nvGrpSpPr>
         <p:grpSpPr>
           <a:xfrm>
-            <a:off x="494831" y="735501"/>
-            <a:ext cx="11202337" cy="5195027"/>
-            <a:chOff x="324786" y="602277"/>
-            <a:chExt cx="11202337" cy="5195027"/>
+            <a:off x="394815" y="614386"/>
+            <a:ext cx="11302353" cy="5316142"/>
+            <a:chOff x="394815" y="614386"/>
+            <a:chExt cx="11302353" cy="5316142"/>
           </a:xfrm>
         </p:grpSpPr>
         <p:grpSp>
           <p:nvGrpSpPr>
-            <p:cNvPr id="18" name="Group 17">
+            <p:cNvPr id="19" name="Group 18">
               <a:extLst>
                 <a:ext uri="{FF2B5EF4-FFF2-40B4-BE49-F238E27FC236}">
-                  <a16:creationId xmlns:a16="http://schemas.microsoft.com/office/drawing/2014/main" id="{973B38FC-E153-9649-BE3E-EC6AD45B8E4B}"/>
+                  <a16:creationId xmlns:a16="http://schemas.microsoft.com/office/drawing/2014/main" id="{A137D02C-7628-19E1-0CE1-72A079C3572A}"/>
                 </a:ext>
               </a:extLst>
             </p:cNvPr>
@@ -5068,69 +5068,38 @@
           </p:nvGrpSpPr>
           <p:grpSpPr>
             <a:xfrm>
-              <a:off x="5365131" y="602277"/>
-              <a:ext cx="6161992" cy="5184005"/>
-              <a:chOff x="5415943" y="662617"/>
-              <a:chExt cx="6382718" cy="5369698"/>
+              <a:off x="494831" y="735501"/>
+              <a:ext cx="11202337" cy="5195027"/>
+              <a:chOff x="324786" y="602277"/>
+              <a:chExt cx="11202337" cy="5195027"/>
             </a:xfrm>
           </p:grpSpPr>
-          <p:pic>
-            <p:nvPicPr>
-              <p:cNvPr id="6" name="Picture 5">
+          <p:grpSp>
+            <p:nvGrpSpPr>
+              <p:cNvPr id="18" name="Group 17">
                 <a:extLst>
                   <a:ext uri="{FF2B5EF4-FFF2-40B4-BE49-F238E27FC236}">
-                    <a16:creationId xmlns:a16="http://schemas.microsoft.com/office/drawing/2014/main" id="{1C993659-2579-77D6-C727-D95747EFEEB5}"/>
+                    <a16:creationId xmlns:a16="http://schemas.microsoft.com/office/drawing/2014/main" id="{973B38FC-E153-9649-BE3E-EC6AD45B8E4B}"/>
                   </a:ext>
                 </a:extLst>
               </p:cNvPr>
-              <p:cNvPicPr>
-                <a:picLocks noChangeAspect="1"/>
-              </p:cNvPicPr>
-              <p:nvPr/>
-            </p:nvPicPr>
-            <p:blipFill>
-              <a:blip r:embed="rId2"/>
-              <a:srcRect r="21497" b="21105"/>
-              <a:stretch/>
-            </p:blipFill>
-            <p:spPr>
-              <a:xfrm>
-                <a:off x="5488611" y="662617"/>
-                <a:ext cx="4955780" cy="1652260"/>
-              </a:xfrm>
-              <a:prstGeom prst="rect">
-                <a:avLst/>
-              </a:prstGeom>
-            </p:spPr>
-          </p:pic>
-          <p:grpSp>
-            <p:nvGrpSpPr>
-              <p:cNvPr id="9" name="Group 8">
-                <a:extLst>
-                  <a:ext uri="{FF2B5EF4-FFF2-40B4-BE49-F238E27FC236}">
-                    <a16:creationId xmlns:a16="http://schemas.microsoft.com/office/drawing/2014/main" id="{1E91252A-2872-AAAC-94E1-7F19EE84B081}"/>
-                  </a:ext>
-                </a:extLst>
-              </p:cNvPr>
-              <p:cNvGrpSpPr>
-                <a:grpSpLocks noChangeAspect="1"/>
-              </p:cNvGrpSpPr>
+              <p:cNvGrpSpPr/>
               <p:nvPr/>
             </p:nvGrpSpPr>
             <p:grpSpPr>
               <a:xfrm>
-                <a:off x="5488611" y="3973307"/>
-                <a:ext cx="4948322" cy="2059008"/>
-                <a:chOff x="2467707" y="3839122"/>
-                <a:chExt cx="4892557" cy="2035804"/>
+                <a:off x="5365131" y="602277"/>
+                <a:ext cx="6161992" cy="5184005"/>
+                <a:chOff x="5415943" y="662617"/>
+                <a:chExt cx="6382718" cy="5369698"/>
               </a:xfrm>
             </p:grpSpPr>
             <p:pic>
               <p:nvPicPr>
-                <p:cNvPr id="3" name="Picture 2">
+                <p:cNvPr id="6" name="Picture 5">
                   <a:extLst>
                     <a:ext uri="{FF2B5EF4-FFF2-40B4-BE49-F238E27FC236}">
-                      <a16:creationId xmlns:a16="http://schemas.microsoft.com/office/drawing/2014/main" id="{38D037F7-E3D1-B9F9-1D9C-1B34E8024407}"/>
+                      <a16:creationId xmlns:a16="http://schemas.microsoft.com/office/drawing/2014/main" id="{1C993659-2579-77D6-C727-D95747EFEEB5}"/>
                     </a:ext>
                   </a:extLst>
                 </p:cNvPr>
@@ -5140,26 +5109,107 @@
                 <p:nvPr/>
               </p:nvPicPr>
               <p:blipFill>
-                <a:blip r:embed="rId3"/>
-                <a:srcRect t="7899" r="21629"/>
+                <a:blip r:embed="rId2"/>
+                <a:srcRect r="21497" b="21105"/>
                 <a:stretch/>
               </p:blipFill>
               <p:spPr>
                 <a:xfrm>
-                  <a:off x="2467707" y="3839122"/>
-                  <a:ext cx="4892557" cy="2035804"/>
+                  <a:off x="5488611" y="662617"/>
+                  <a:ext cx="4955780" cy="1652260"/>
                 </a:xfrm>
                 <a:prstGeom prst="rect">
                   <a:avLst/>
                 </a:prstGeom>
               </p:spPr>
             </p:pic>
+            <p:grpSp>
+              <p:nvGrpSpPr>
+                <p:cNvPr id="9" name="Group 8">
+                  <a:extLst>
+                    <a:ext uri="{FF2B5EF4-FFF2-40B4-BE49-F238E27FC236}">
+                      <a16:creationId xmlns:a16="http://schemas.microsoft.com/office/drawing/2014/main" id="{1E91252A-2872-AAAC-94E1-7F19EE84B081}"/>
+                    </a:ext>
+                  </a:extLst>
+                </p:cNvPr>
+                <p:cNvGrpSpPr>
+                  <a:grpSpLocks noChangeAspect="1"/>
+                </p:cNvGrpSpPr>
+                <p:nvPr/>
+              </p:nvGrpSpPr>
+              <p:grpSpPr>
+                <a:xfrm>
+                  <a:off x="5488611" y="3973307"/>
+                  <a:ext cx="4948322" cy="2059008"/>
+                  <a:chOff x="2467707" y="3839122"/>
+                  <a:chExt cx="4892557" cy="2035804"/>
+                </a:xfrm>
+              </p:grpSpPr>
+              <p:pic>
+                <p:nvPicPr>
+                  <p:cNvPr id="3" name="Picture 2">
+                    <a:extLst>
+                      <a:ext uri="{FF2B5EF4-FFF2-40B4-BE49-F238E27FC236}">
+                        <a16:creationId xmlns:a16="http://schemas.microsoft.com/office/drawing/2014/main" id="{38D037F7-E3D1-B9F9-1D9C-1B34E8024407}"/>
+                      </a:ext>
+                    </a:extLst>
+                  </p:cNvPr>
+                  <p:cNvPicPr>
+                    <a:picLocks noChangeAspect="1"/>
+                  </p:cNvPicPr>
+                  <p:nvPr/>
+                </p:nvPicPr>
+                <p:blipFill>
+                  <a:blip r:embed="rId3"/>
+                  <a:srcRect t="7899" r="21629"/>
+                  <a:stretch/>
+                </p:blipFill>
+                <p:spPr>
+                  <a:xfrm>
+                    <a:off x="2467707" y="3839122"/>
+                    <a:ext cx="4892557" cy="2035804"/>
+                  </a:xfrm>
+                  <a:prstGeom prst="rect">
+                    <a:avLst/>
+                  </a:prstGeom>
+                </p:spPr>
+              </p:pic>
+              <p:pic>
+                <p:nvPicPr>
+                  <p:cNvPr id="7" name="Picture 6">
+                    <a:extLst>
+                      <a:ext uri="{FF2B5EF4-FFF2-40B4-BE49-F238E27FC236}">
+                        <a16:creationId xmlns:a16="http://schemas.microsoft.com/office/drawing/2014/main" id="{99C7EEB7-6F10-1F91-5EC5-FEDB5D5D18E1}"/>
+                      </a:ext>
+                    </a:extLst>
+                  </p:cNvPr>
+                  <p:cNvPicPr>
+                    <a:picLocks noChangeAspect="1"/>
+                  </p:cNvPicPr>
+                  <p:nvPr/>
+                </p:nvPicPr>
+                <p:blipFill>
+                  <a:blip r:embed="rId4"/>
+                  <a:srcRect l="8298" r="85271" b="91963"/>
+                  <a:stretch/>
+                </p:blipFill>
+                <p:spPr>
+                  <a:xfrm>
+                    <a:off x="2913787" y="4022858"/>
+                    <a:ext cx="358556" cy="155900"/>
+                  </a:xfrm>
+                  <a:prstGeom prst="rect">
+                    <a:avLst/>
+                  </a:prstGeom>
+                </p:spPr>
+              </p:pic>
+            </p:grpSp>
             <p:pic>
               <p:nvPicPr>
-                <p:cNvPr id="7" name="Picture 6">
+                <p:cNvPr id="2" name="Picture 1">
                   <a:extLst>
                     <a:ext uri="{FF2B5EF4-FFF2-40B4-BE49-F238E27FC236}">
-                      <a16:creationId xmlns:a16="http://schemas.microsoft.com/office/drawing/2014/main" id="{99C7EEB7-6F10-1F91-5EC5-FEDB5D5D18E1}"/>
+                      <a16:creationId xmlns:a16="http://schemas.microsoft.com/office/drawing/2014/main" id="{D89C3906-FF37-ED81-0DB3-DF12D060AD22}"/>
                     </a:ext>
                   </a:extLst>
                 </p:cNvPr>
@@ -5169,14 +5219,14 @@
                 <p:nvPr/>
               </p:nvPicPr>
               <p:blipFill>
-                <a:blip r:embed="rId4"/>
-                <a:srcRect l="8298" r="85271" b="91963"/>
+                <a:blip r:embed="rId5"/>
+                <a:srcRect b="20519"/>
                 <a:stretch/>
               </p:blipFill>
               <p:spPr>
                 <a:xfrm>
-                  <a:off x="2913787" y="4022858"/>
-                  <a:ext cx="358556" cy="155900"/>
+                  <a:off x="5415943" y="2293428"/>
+                  <a:ext cx="6382718" cy="1688360"/>
                 </a:xfrm>
                 <a:prstGeom prst="rect">
                   <a:avLst/>
@@ -5184,120 +5234,12 @@
               </p:spPr>
             </p:pic>
           </p:grpSp>
-          <p:pic>
-            <p:nvPicPr>
-              <p:cNvPr id="2" name="Picture 1">
+          <p:grpSp>
+            <p:nvGrpSpPr>
+              <p:cNvPr id="12" name="Group 11">
                 <a:extLst>
                   <a:ext uri="{FF2B5EF4-FFF2-40B4-BE49-F238E27FC236}">
-                    <a16:creationId xmlns:a16="http://schemas.microsoft.com/office/drawing/2014/main" id="{D89C3906-FF37-ED81-0DB3-DF12D060AD22}"/>
-                  </a:ext>
-                </a:extLst>
-              </p:cNvPr>
-              <p:cNvPicPr>
-                <a:picLocks noChangeAspect="1"/>
-              </p:cNvPicPr>
-              <p:nvPr/>
-            </p:nvPicPr>
-            <p:blipFill>
-              <a:blip r:embed="rId5"/>
-              <a:srcRect b="20519"/>
-              <a:stretch/>
-            </p:blipFill>
-            <p:spPr>
-              <a:xfrm>
-                <a:off x="5415943" y="2293428"/>
-                <a:ext cx="6382718" cy="1688360"/>
-              </a:xfrm>
-              <a:prstGeom prst="rect">
-                <a:avLst/>
-              </a:prstGeom>
-            </p:spPr>
-          </p:pic>
-        </p:grpSp>
-        <p:grpSp>
-          <p:nvGrpSpPr>
-            <p:cNvPr id="12" name="Group 11">
-              <a:extLst>
-                <a:ext uri="{FF2B5EF4-FFF2-40B4-BE49-F238E27FC236}">
-                  <a16:creationId xmlns:a16="http://schemas.microsoft.com/office/drawing/2014/main" id="{6891C747-36E9-8DFA-1B0B-79F29655D19F}"/>
-                </a:ext>
-              </a:extLst>
-            </p:cNvPr>
-            <p:cNvGrpSpPr/>
-            <p:nvPr/>
-          </p:nvGrpSpPr>
-          <p:grpSpPr>
-            <a:xfrm>
-              <a:off x="324786" y="602277"/>
-              <a:ext cx="4938656" cy="5195027"/>
-              <a:chOff x="1089062" y="545709"/>
-              <a:chExt cx="4938656" cy="5195027"/>
-            </a:xfrm>
-          </p:grpSpPr>
-          <p:pic>
-            <p:nvPicPr>
-              <p:cNvPr id="13" name="Picture 12">
-                <a:extLst>
-                  <a:ext uri="{FF2B5EF4-FFF2-40B4-BE49-F238E27FC236}">
-                    <a16:creationId xmlns:a16="http://schemas.microsoft.com/office/drawing/2014/main" id="{81F3812D-B3AA-C310-29BB-9D452D0A0956}"/>
-                  </a:ext>
-                </a:extLst>
-              </p:cNvPr>
-              <p:cNvPicPr>
-                <a:picLocks noChangeAspect="1"/>
-              </p:cNvPicPr>
-              <p:nvPr/>
-            </p:nvPicPr>
-            <p:blipFill>
-              <a:blip r:embed="rId6"/>
-              <a:srcRect r="21593" b="21776"/>
-              <a:stretch/>
-            </p:blipFill>
-            <p:spPr>
-              <a:xfrm>
-                <a:off x="1130687" y="2150101"/>
-                <a:ext cx="4846219" cy="1586224"/>
-              </a:xfrm>
-              <a:prstGeom prst="rect">
-                <a:avLst/>
-              </a:prstGeom>
-            </p:spPr>
-          </p:pic>
-          <p:pic>
-            <p:nvPicPr>
-              <p:cNvPr id="14" name="Picture 13">
-                <a:extLst>
-                  <a:ext uri="{FF2B5EF4-FFF2-40B4-BE49-F238E27FC236}">
-                    <a16:creationId xmlns:a16="http://schemas.microsoft.com/office/drawing/2014/main" id="{98B7E85A-B596-E205-2EDC-AFFFA5148269}"/>
-                  </a:ext>
-                </a:extLst>
-              </p:cNvPr>
-              <p:cNvPicPr>
-                <a:picLocks noChangeAspect="1"/>
-              </p:cNvPicPr>
-              <p:nvPr/>
-            </p:nvPicPr>
-            <p:blipFill>
-              <a:blip r:embed="rId7"/>
-              <a:srcRect r="22825" b="21776"/>
-              <a:stretch/>
-            </p:blipFill>
-            <p:spPr>
-              <a:xfrm>
-                <a:off x="1198930" y="545709"/>
-                <a:ext cx="4717419" cy="1586224"/>
-              </a:xfrm>
-              <a:prstGeom prst="rect">
-                <a:avLst/>
-              </a:prstGeom>
-            </p:spPr>
-          </p:pic>
-          <p:grpSp>
-            <p:nvGrpSpPr>
-              <p:cNvPr id="15" name="Group 14">
-                <a:extLst>
-                  <a:ext uri="{FF2B5EF4-FFF2-40B4-BE49-F238E27FC236}">
-                    <a16:creationId xmlns:a16="http://schemas.microsoft.com/office/drawing/2014/main" id="{671F9C5A-938C-CCE8-CC81-FB9E024355A9}"/>
+                    <a16:creationId xmlns:a16="http://schemas.microsoft.com/office/drawing/2014/main" id="{6891C747-36E9-8DFA-1B0B-79F29655D19F}"/>
                   </a:ext>
                 </a:extLst>
               </p:cNvPr>
@@ -5306,18 +5248,18 @@
             </p:nvGrpSpPr>
             <p:grpSpPr>
               <a:xfrm>
-                <a:off x="1089062" y="3736325"/>
-                <a:ext cx="4938656" cy="2004411"/>
-                <a:chOff x="1089062" y="3978527"/>
-                <a:chExt cx="4929468" cy="2000682"/>
+                <a:off x="324786" y="602277"/>
+                <a:ext cx="4938656" cy="5195027"/>
+                <a:chOff x="1089062" y="545709"/>
+                <a:chExt cx="4938656" cy="5195027"/>
               </a:xfrm>
             </p:grpSpPr>
             <p:pic>
               <p:nvPicPr>
-                <p:cNvPr id="16" name="Picture 15">
+                <p:cNvPr id="13" name="Picture 12">
                   <a:extLst>
                     <a:ext uri="{FF2B5EF4-FFF2-40B4-BE49-F238E27FC236}">
-                      <a16:creationId xmlns:a16="http://schemas.microsoft.com/office/drawing/2014/main" id="{B37A0898-36D5-DA6C-0EB9-6B7C25E385EE}"/>
+                      <a16:creationId xmlns:a16="http://schemas.microsoft.com/office/drawing/2014/main" id="{81F3812D-B3AA-C310-29BB-9D452D0A0956}"/>
                     </a:ext>
                   </a:extLst>
                 </p:cNvPr>
@@ -5327,14 +5269,14 @@
                 <p:nvPr/>
               </p:nvPicPr>
               <p:blipFill>
-                <a:blip r:embed="rId4"/>
-                <a:srcRect t="7476" r="20675"/>
+                <a:blip r:embed="rId6"/>
+                <a:srcRect r="21593" b="21776"/>
                 <a:stretch/>
               </p:blipFill>
               <p:spPr>
                 <a:xfrm>
-                  <a:off x="1089062" y="3978527"/>
-                  <a:ext cx="4929468" cy="2000682"/>
+                  <a:off x="1130687" y="2150101"/>
+                  <a:ext cx="4846219" cy="1586224"/>
                 </a:xfrm>
                 <a:prstGeom prst="rect">
                   <a:avLst/>
@@ -5343,10 +5285,10 @@
             </p:pic>
             <p:pic>
               <p:nvPicPr>
-                <p:cNvPr id="17" name="Picture 16">
+                <p:cNvPr id="14" name="Picture 13">
                   <a:extLst>
                     <a:ext uri="{FF2B5EF4-FFF2-40B4-BE49-F238E27FC236}">
-                      <a16:creationId xmlns:a16="http://schemas.microsoft.com/office/drawing/2014/main" id="{88157B62-CED9-479B-398A-769AD2A1B14F}"/>
+                      <a16:creationId xmlns:a16="http://schemas.microsoft.com/office/drawing/2014/main" id="{98B7E85A-B596-E205-2EDC-AFFFA5148269}"/>
                     </a:ext>
                   </a:extLst>
                 </p:cNvPr>
@@ -5356,22 +5298,177 @@
                 <p:nvPr/>
               </p:nvPicPr>
               <p:blipFill>
-                <a:blip r:embed="rId4"/>
-                <a:srcRect l="8298" r="85271" b="91963"/>
+                <a:blip r:embed="rId7"/>
+                <a:srcRect r="22825" b="21776"/>
                 <a:stretch/>
               </p:blipFill>
               <p:spPr>
                 <a:xfrm>
-                  <a:off x="1641075" y="4010664"/>
-                  <a:ext cx="357889" cy="155610"/>
+                  <a:off x="1198930" y="545709"/>
+                  <a:ext cx="4717419" cy="1586224"/>
                 </a:xfrm>
                 <a:prstGeom prst="rect">
                   <a:avLst/>
                 </a:prstGeom>
               </p:spPr>
             </p:pic>
+            <p:grpSp>
+              <p:nvGrpSpPr>
+                <p:cNvPr id="15" name="Group 14">
+                  <a:extLst>
+                    <a:ext uri="{FF2B5EF4-FFF2-40B4-BE49-F238E27FC236}">
+                      <a16:creationId xmlns:a16="http://schemas.microsoft.com/office/drawing/2014/main" id="{671F9C5A-938C-CCE8-CC81-FB9E024355A9}"/>
+                    </a:ext>
+                  </a:extLst>
+                </p:cNvPr>
+                <p:cNvGrpSpPr/>
+                <p:nvPr/>
+              </p:nvGrpSpPr>
+              <p:grpSpPr>
+                <a:xfrm>
+                  <a:off x="1089062" y="3736325"/>
+                  <a:ext cx="4938656" cy="2004411"/>
+                  <a:chOff x="1089062" y="3978527"/>
+                  <a:chExt cx="4929468" cy="2000682"/>
+                </a:xfrm>
+              </p:grpSpPr>
+              <p:pic>
+                <p:nvPicPr>
+                  <p:cNvPr id="16" name="Picture 15">
+                    <a:extLst>
+                      <a:ext uri="{FF2B5EF4-FFF2-40B4-BE49-F238E27FC236}">
+                        <a16:creationId xmlns:a16="http://schemas.microsoft.com/office/drawing/2014/main" id="{B37A0898-36D5-DA6C-0EB9-6B7C25E385EE}"/>
+                      </a:ext>
+                    </a:extLst>
+                  </p:cNvPr>
+                  <p:cNvPicPr>
+                    <a:picLocks noChangeAspect="1"/>
+                  </p:cNvPicPr>
+                  <p:nvPr/>
+                </p:nvPicPr>
+                <p:blipFill>
+                  <a:blip r:embed="rId4"/>
+                  <a:srcRect t="7476" r="20675"/>
+                  <a:stretch/>
+                </p:blipFill>
+                <p:spPr>
+                  <a:xfrm>
+                    <a:off x="1089062" y="3978527"/>
+                    <a:ext cx="4929468" cy="2000682"/>
+                  </a:xfrm>
+                  <a:prstGeom prst="rect">
+                    <a:avLst/>
+                  </a:prstGeom>
+                </p:spPr>
+              </p:pic>
+              <p:pic>
+                <p:nvPicPr>
+                  <p:cNvPr id="17" name="Picture 16">
+                    <a:extLst>
+                      <a:ext uri="{FF2B5EF4-FFF2-40B4-BE49-F238E27FC236}">
+                        <a16:creationId xmlns:a16="http://schemas.microsoft.com/office/drawing/2014/main" id="{88157B62-CED9-479B-398A-769AD2A1B14F}"/>
+                      </a:ext>
+                    </a:extLst>
+                  </p:cNvPr>
+                  <p:cNvPicPr>
+                    <a:picLocks noChangeAspect="1"/>
+                  </p:cNvPicPr>
+                  <p:nvPr/>
+                </p:nvPicPr>
+                <p:blipFill>
+                  <a:blip r:embed="rId4"/>
+                  <a:srcRect l="8298" r="85271" b="91963"/>
+                  <a:stretch/>
+                </p:blipFill>
+                <p:spPr>
+                  <a:xfrm>
+                    <a:off x="1641075" y="4010664"/>
+                    <a:ext cx="357889" cy="155610"/>
+                  </a:xfrm>
+                  <a:prstGeom prst="rect">
+                    <a:avLst/>
+                  </a:prstGeom>
+                </p:spPr>
+              </p:pic>
+            </p:grpSp>
           </p:grpSp>
         </p:grpSp>
+        <p:sp>
+          <p:nvSpPr>
+            <p:cNvPr id="4" name="TextBox 3">
+              <a:extLst>
+                <a:ext uri="{FF2B5EF4-FFF2-40B4-BE49-F238E27FC236}">
+                  <a16:creationId xmlns:a16="http://schemas.microsoft.com/office/drawing/2014/main" id="{B203973D-BC5A-CF0B-79B4-6CC4236D6F1F}"/>
+                </a:ext>
+              </a:extLst>
+            </p:cNvPr>
+            <p:cNvSpPr txBox="1"/>
+            <p:nvPr/>
+          </p:nvSpPr>
+          <p:spPr>
+            <a:xfrm>
+              <a:off x="394815" y="614386"/>
+              <a:ext cx="429950" cy="338554"/>
+            </a:xfrm>
+            <a:prstGeom prst="rect">
+              <a:avLst/>
+            </a:prstGeom>
+            <a:noFill/>
+          </p:spPr>
+          <p:txBody>
+            <a:bodyPr wrap="square" rtlCol="0">
+              <a:spAutoFit/>
+            </a:bodyPr>
+            <a:lstStyle/>
+            <a:p>
+              <a:r>
+                <a:rPr lang="en-US" sz="1600" dirty="0">
+                  <a:latin typeface="Times New Roman" panose="02020603050405020304" pitchFamily="18" charset="0"/>
+                  <a:cs typeface="Times New Roman" panose="02020603050405020304" pitchFamily="18" charset="0"/>
+                </a:rPr>
+                <a:t>(a)</a:t>
+              </a:r>
+            </a:p>
+          </p:txBody>
+        </p:sp>
+        <p:sp>
+          <p:nvSpPr>
+            <p:cNvPr id="5" name="TextBox 4">
+              <a:extLst>
+                <a:ext uri="{FF2B5EF4-FFF2-40B4-BE49-F238E27FC236}">
+                  <a16:creationId xmlns:a16="http://schemas.microsoft.com/office/drawing/2014/main" id="{BF211872-5FDF-D15A-CF32-5627FDDD1D23}"/>
+                </a:ext>
+              </a:extLst>
+            </p:cNvPr>
+            <p:cNvSpPr txBox="1"/>
+            <p:nvPr/>
+          </p:nvSpPr>
+          <p:spPr>
+            <a:xfrm>
+              <a:off x="5392273" y="614386"/>
+              <a:ext cx="429950" cy="338554"/>
+            </a:xfrm>
+            <a:prstGeom prst="rect">
+              <a:avLst/>
+            </a:prstGeom>
+            <a:noFill/>
+          </p:spPr>
+          <p:txBody>
+            <a:bodyPr wrap="square" rtlCol="0">
+              <a:spAutoFit/>
+            </a:bodyPr>
+            <a:lstStyle/>
+            <a:p>
+              <a:r>
+                <a:rPr lang="en-US" sz="1600" dirty="0">
+                  <a:latin typeface="Times New Roman" panose="02020603050405020304" pitchFamily="18" charset="0"/>
+                  <a:cs typeface="Times New Roman" panose="02020603050405020304" pitchFamily="18" charset="0"/>
+                </a:rPr>
+                <a:t>(b)</a:t>
+              </a:r>
+            </a:p>
+          </p:txBody>
+        </p:sp>
       </p:grpSp>
     </p:spTree>
     <p:extLst>
@@ -6656,6 +6753,169 @@
           <a:chExt cx="0" cy="0"/>
         </a:xfrm>
       </p:grpSpPr>
+      <p:grpSp>
+        <p:nvGrpSpPr>
+          <p:cNvPr id="5" name="Group 4">
+            <a:extLst>
+              <a:ext uri="{FF2B5EF4-FFF2-40B4-BE49-F238E27FC236}">
+                <a16:creationId xmlns:a16="http://schemas.microsoft.com/office/drawing/2014/main" id="{63BF4EBB-4AB3-899F-0E0A-A56D19B026C1}"/>
+              </a:ext>
+            </a:extLst>
+          </p:cNvPr>
+          <p:cNvGrpSpPr/>
+          <p:nvPr/>
+        </p:nvGrpSpPr>
+        <p:grpSpPr>
+          <a:xfrm>
+            <a:off x="1193800" y="2093750"/>
+            <a:ext cx="8010757" cy="1993313"/>
+            <a:chOff x="1193800" y="2093750"/>
+            <a:chExt cx="8010757" cy="1993313"/>
+          </a:xfrm>
+        </p:grpSpPr>
+        <p:pic>
+          <p:nvPicPr>
+            <p:cNvPr id="3" name="Picture 2">
+              <a:extLst>
+                <a:ext uri="{FF2B5EF4-FFF2-40B4-BE49-F238E27FC236}">
+                  <a16:creationId xmlns:a16="http://schemas.microsoft.com/office/drawing/2014/main" id="{D6F505FA-35B5-15BF-F6A3-D5B05FCE5094}"/>
+                </a:ext>
+              </a:extLst>
+            </p:cNvPr>
+            <p:cNvPicPr>
+              <a:picLocks noChangeAspect="1"/>
+            </p:cNvPicPr>
+            <p:nvPr/>
+          </p:nvPicPr>
+          <p:blipFill>
+            <a:blip r:embed="rId2"/>
+            <a:stretch>
+              <a:fillRect/>
+            </a:stretch>
+          </p:blipFill>
+          <p:spPr>
+            <a:xfrm>
+              <a:off x="1193800" y="2305050"/>
+              <a:ext cx="7772400" cy="1782013"/>
+            </a:xfrm>
+            <a:prstGeom prst="rect">
+              <a:avLst/>
+            </a:prstGeom>
+          </p:spPr>
+        </p:pic>
+        <mc:AlternateContent xmlns:mc="http://schemas.openxmlformats.org/markup-compatibility/2006" xmlns:a14="http://schemas.microsoft.com/office/drawing/2010/main">
+          <mc:Choice Requires="a14">
+            <p:sp>
+              <p:nvSpPr>
+                <p:cNvPr id="4" name="TextBox 3">
+                  <a:extLst>
+                    <a:ext uri="{FF2B5EF4-FFF2-40B4-BE49-F238E27FC236}">
+                      <a16:creationId xmlns:a16="http://schemas.microsoft.com/office/drawing/2014/main" id="{1CA016AC-4F99-344A-F92A-1B0FE0BED138}"/>
+                    </a:ext>
+                  </a:extLst>
+                </p:cNvPr>
+                <p:cNvSpPr txBox="1"/>
+                <p:nvPr/>
+              </p:nvSpPr>
+              <p:spPr>
+                <a:xfrm>
+                  <a:off x="8285259" y="2093750"/>
+                  <a:ext cx="919298" cy="276999"/>
+                </a:xfrm>
+                <a:prstGeom prst="rect">
+                  <a:avLst/>
+                </a:prstGeom>
+                <a:noFill/>
+              </p:spPr>
+              <p:txBody>
+                <a:bodyPr wrap="square" rtlCol="0">
+                  <a:spAutoFit/>
+                </a:bodyPr>
+                <a:lstStyle/>
+                <a:p>
+                  <a14:m>
+                    <m:oMath xmlns:m="http://schemas.openxmlformats.org/officeDocument/2006/math">
+                      <m:r>
+                        <a:rPr lang="en-US" sz="1200" b="0" i="1" smtClean="0">
+                          <a:latin typeface="Cambria Math" panose="02040503050406030204" pitchFamily="18" charset="0"/>
+                          <a:cs typeface="Times New Roman" panose="02020603050405020304" pitchFamily="18" charset="0"/>
+                        </a:rPr>
+                        <m:t>𝑊</m:t>
+                      </m:r>
+                      <m:r>
+                        <a:rPr lang="en-US" sz="1200" b="0" i="1" smtClean="0">
+                          <a:latin typeface="Cambria Math" panose="02040503050406030204" pitchFamily="18" charset="0"/>
+                          <a:cs typeface="Times New Roman" panose="02020603050405020304" pitchFamily="18" charset="0"/>
+                        </a:rPr>
+                        <m:t>/2</m:t>
+                      </m:r>
+                      <m:r>
+                        <a:rPr lang="en-US" sz="1200" b="0" i="1" smtClean="0">
+                          <a:latin typeface="Cambria Math" panose="02040503050406030204" pitchFamily="18" charset="0"/>
+                          <a:ea typeface="Cambria Math" panose="02040503050406030204" pitchFamily="18" charset="0"/>
+                          <a:cs typeface="Times New Roman" panose="02020603050405020304" pitchFamily="18" charset="0"/>
+                        </a:rPr>
+                        <m:t>𝜋</m:t>
+                      </m:r>
+                    </m:oMath>
+                  </a14:m>
+                  <a:r>
+                    <a:rPr lang="en-US" sz="1200" dirty="0">
+                      <a:latin typeface="Times New Roman" panose="02020603050405020304" pitchFamily="18" charset="0"/>
+                      <a:cs typeface="Times New Roman" panose="02020603050405020304" pitchFamily="18" charset="0"/>
+                    </a:rPr>
+                    <a:t> [Hz]</a:t>
+                  </a:r>
+                </a:p>
+              </p:txBody>
+            </p:sp>
+          </mc:Choice>
+          <mc:Fallback xmlns="">
+            <p:sp>
+              <p:nvSpPr>
+                <p:cNvPr id="4" name="TextBox 3">
+                  <a:extLst>
+                    <a:ext uri="{FF2B5EF4-FFF2-40B4-BE49-F238E27FC236}">
+                      <a16:creationId xmlns:a16="http://schemas.microsoft.com/office/drawing/2014/main" id="{1CA016AC-4F99-344A-F92A-1B0FE0BED138}"/>
+                    </a:ext>
+                  </a:extLst>
+                </p:cNvPr>
+                <p:cNvSpPr txBox="1">
+                  <a:spLocks noRot="1" noChangeAspect="1" noMove="1" noResize="1" noEditPoints="1" noAdjustHandles="1" noChangeArrowheads="1" noChangeShapeType="1" noTextEdit="1"/>
+                </p:cNvSpPr>
+                <p:nvPr/>
+              </p:nvSpPr>
+              <p:spPr>
+                <a:xfrm>
+                  <a:off x="8285259" y="2093750"/>
+                  <a:ext cx="919298" cy="276999"/>
+                </a:xfrm>
+                <a:prstGeom prst="rect">
+                  <a:avLst/>
+                </a:prstGeom>
+                <a:blipFill>
+                  <a:blip r:embed="rId3"/>
+                  <a:stretch>
+                    <a:fillRect b="-17391"/>
+                  </a:stretch>
+                </a:blipFill>
+              </p:spPr>
+              <p:txBody>
+                <a:bodyPr/>
+                <a:lstStyle/>
+                <a:p>
+                  <a:r>
+                    <a:rPr lang="en-US">
+                      <a:noFill/>
+                    </a:rPr>
+                    <a:t> </a:t>
+                  </a:r>
+                </a:p>
+              </p:txBody>
+            </p:sp>
+          </mc:Fallback>
+        </mc:AlternateContent>
+      </p:grpSp>
     </p:spTree>
     <p:extLst>
       <p:ext uri="{BB962C8B-B14F-4D97-AF65-F5344CB8AC3E}">
@@ -6692,6 +6952,2633 @@
           <a:chExt cx="0" cy="0"/>
         </a:xfrm>
       </p:grpSpPr>
+      <mc:AlternateContent xmlns:mc="http://schemas.openxmlformats.org/markup-compatibility/2006" xmlns:a14="http://schemas.microsoft.com/office/drawing/2010/main">
+        <mc:Choice Requires="a14">
+          <p:sp>
+            <p:nvSpPr>
+              <p:cNvPr id="14" name="TextBox 13">
+                <a:extLst>
+                  <a:ext uri="{FF2B5EF4-FFF2-40B4-BE49-F238E27FC236}">
+                    <a16:creationId xmlns:a16="http://schemas.microsoft.com/office/drawing/2014/main" id="{42792514-5ECB-2017-5601-2AAEA3CEFA5F}"/>
+                  </a:ext>
+                </a:extLst>
+              </p:cNvPr>
+              <p:cNvSpPr txBox="1"/>
+              <p:nvPr/>
+            </p:nvSpPr>
+            <p:spPr>
+              <a:xfrm>
+                <a:off x="104105" y="1731155"/>
+                <a:ext cx="919298" cy="276999"/>
+              </a:xfrm>
+              <a:prstGeom prst="rect">
+                <a:avLst/>
+              </a:prstGeom>
+              <a:noFill/>
+            </p:spPr>
+            <p:txBody>
+              <a:bodyPr wrap="square" rtlCol="0">
+                <a:spAutoFit/>
+              </a:bodyPr>
+              <a:lstStyle/>
+              <a:p>
+                <a14:m>
+                  <m:oMath xmlns:m="http://schemas.openxmlformats.org/officeDocument/2006/math">
+                    <m:r>
+                      <a:rPr lang="en-US" sz="1200" b="0" i="1" smtClean="0">
+                        <a:latin typeface="Cambria Math" panose="02040503050406030204" pitchFamily="18" charset="0"/>
+                        <a:cs typeface="Times New Roman" panose="02020603050405020304" pitchFamily="18" charset="0"/>
+                      </a:rPr>
+                      <m:t>𝐸𝑛𝑟</m:t>
+                    </m:r>
+                  </m:oMath>
+                </a14:m>
+                <a:r>
+                  <a:rPr lang="en-US" sz="1200" dirty="0">
+                    <a:latin typeface="Times New Roman" panose="02020603050405020304" pitchFamily="18" charset="0"/>
+                    <a:cs typeface="Times New Roman" panose="02020603050405020304" pitchFamily="18" charset="0"/>
+                  </a:rPr>
+                  <a:t> 12</a:t>
+                </a:r>
+              </a:p>
+            </p:txBody>
+          </p:sp>
+        </mc:Choice>
+        <mc:Fallback xmlns="">
+          <p:sp>
+            <p:nvSpPr>
+              <p:cNvPr id="14" name="TextBox 13">
+                <a:extLst>
+                  <a:ext uri="{FF2B5EF4-FFF2-40B4-BE49-F238E27FC236}">
+                    <a16:creationId xmlns:a16="http://schemas.microsoft.com/office/drawing/2014/main" id="{42792514-5ECB-2017-5601-2AAEA3CEFA5F}"/>
+                  </a:ext>
+                </a:extLst>
+              </p:cNvPr>
+              <p:cNvSpPr txBox="1">
+                <a:spLocks noRot="1" noChangeAspect="1" noMove="1" noResize="1" noEditPoints="1" noAdjustHandles="1" noChangeArrowheads="1" noChangeShapeType="1" noTextEdit="1"/>
+              </p:cNvSpPr>
+              <p:nvPr/>
+            </p:nvSpPr>
+            <p:spPr>
+              <a:xfrm>
+                <a:off x="104105" y="1731155"/>
+                <a:ext cx="919298" cy="276999"/>
+              </a:xfrm>
+              <a:prstGeom prst="rect">
+                <a:avLst/>
+              </a:prstGeom>
+              <a:blipFill>
+                <a:blip r:embed="rId2"/>
+                <a:stretch>
+                  <a:fillRect b="-22727"/>
+                </a:stretch>
+              </a:blipFill>
+            </p:spPr>
+            <p:txBody>
+              <a:bodyPr/>
+              <a:lstStyle/>
+              <a:p>
+                <a:r>
+                  <a:rPr lang="en-US">
+                    <a:noFill/>
+                  </a:rPr>
+                  <a:t> </a:t>
+                </a:r>
+              </a:p>
+            </p:txBody>
+          </p:sp>
+        </mc:Fallback>
+      </mc:AlternateContent>
+      <mc:AlternateContent xmlns:mc="http://schemas.openxmlformats.org/markup-compatibility/2006" xmlns:a14="http://schemas.microsoft.com/office/drawing/2010/main">
+        <mc:Choice Requires="a14">
+          <p:sp>
+            <p:nvSpPr>
+              <p:cNvPr id="15" name="TextBox 14">
+                <a:extLst>
+                  <a:ext uri="{FF2B5EF4-FFF2-40B4-BE49-F238E27FC236}">
+                    <a16:creationId xmlns:a16="http://schemas.microsoft.com/office/drawing/2014/main" id="{7B1AA755-FA70-03AA-7F8C-760F1E95992B}"/>
+                  </a:ext>
+                </a:extLst>
+              </p:cNvPr>
+              <p:cNvSpPr txBox="1"/>
+              <p:nvPr/>
+            </p:nvSpPr>
+            <p:spPr>
+              <a:xfrm>
+                <a:off x="73827" y="4916416"/>
+                <a:ext cx="919298" cy="276999"/>
+              </a:xfrm>
+              <a:prstGeom prst="rect">
+                <a:avLst/>
+              </a:prstGeom>
+              <a:noFill/>
+            </p:spPr>
+            <p:txBody>
+              <a:bodyPr wrap="square" rtlCol="0">
+                <a:spAutoFit/>
+              </a:bodyPr>
+              <a:lstStyle/>
+              <a:p>
+                <a14:m>
+                  <m:oMath xmlns:m="http://schemas.openxmlformats.org/officeDocument/2006/math">
+                    <m:r>
+                      <a:rPr lang="en-US" sz="1200" b="0" i="1" smtClean="0">
+                        <a:latin typeface="Cambria Math" panose="02040503050406030204" pitchFamily="18" charset="0"/>
+                        <a:cs typeface="Times New Roman" panose="02020603050405020304" pitchFamily="18" charset="0"/>
+                      </a:rPr>
+                      <m:t>𝐸𝑛𝑟</m:t>
+                    </m:r>
+                  </m:oMath>
+                </a14:m>
+                <a:r>
+                  <a:rPr lang="en-US" sz="1200" dirty="0">
+                    <a:latin typeface="Times New Roman" panose="02020603050405020304" pitchFamily="18" charset="0"/>
+                    <a:cs typeface="Times New Roman" panose="02020603050405020304" pitchFamily="18" charset="0"/>
+                  </a:rPr>
+                  <a:t> 3</a:t>
+                </a:r>
+              </a:p>
+            </p:txBody>
+          </p:sp>
+        </mc:Choice>
+        <mc:Fallback xmlns="">
+          <p:sp>
+            <p:nvSpPr>
+              <p:cNvPr id="15" name="TextBox 14">
+                <a:extLst>
+                  <a:ext uri="{FF2B5EF4-FFF2-40B4-BE49-F238E27FC236}">
+                    <a16:creationId xmlns:a16="http://schemas.microsoft.com/office/drawing/2014/main" id="{7B1AA755-FA70-03AA-7F8C-760F1E95992B}"/>
+                  </a:ext>
+                </a:extLst>
+              </p:cNvPr>
+              <p:cNvSpPr txBox="1">
+                <a:spLocks noRot="1" noChangeAspect="1" noMove="1" noResize="1" noEditPoints="1" noAdjustHandles="1" noChangeArrowheads="1" noChangeShapeType="1" noTextEdit="1"/>
+              </p:cNvSpPr>
+              <p:nvPr/>
+            </p:nvSpPr>
+            <p:spPr>
+              <a:xfrm>
+                <a:off x="73827" y="4916416"/>
+                <a:ext cx="919298" cy="276999"/>
+              </a:xfrm>
+              <a:prstGeom prst="rect">
+                <a:avLst/>
+              </a:prstGeom>
+              <a:blipFill>
+                <a:blip r:embed="rId3"/>
+                <a:stretch>
+                  <a:fillRect b="-17391"/>
+                </a:stretch>
+              </a:blipFill>
+            </p:spPr>
+            <p:txBody>
+              <a:bodyPr/>
+              <a:lstStyle/>
+              <a:p>
+                <a:r>
+                  <a:rPr lang="en-US">
+                    <a:noFill/>
+                  </a:rPr>
+                  <a:t> </a:t>
+                </a:r>
+              </a:p>
+            </p:txBody>
+          </p:sp>
+        </mc:Fallback>
+      </mc:AlternateContent>
+      <mc:AlternateContent xmlns:mc="http://schemas.openxmlformats.org/markup-compatibility/2006" xmlns:a14="http://schemas.microsoft.com/office/drawing/2010/main">
+        <mc:Choice Requires="a14">
+          <p:sp>
+            <p:nvSpPr>
+              <p:cNvPr id="16" name="TextBox 15">
+                <a:extLst>
+                  <a:ext uri="{FF2B5EF4-FFF2-40B4-BE49-F238E27FC236}">
+                    <a16:creationId xmlns:a16="http://schemas.microsoft.com/office/drawing/2014/main" id="{AFD4A126-468B-C8CC-0A4B-0933C60B34B5}"/>
+                  </a:ext>
+                </a:extLst>
+              </p:cNvPr>
+              <p:cNvSpPr txBox="1"/>
+              <p:nvPr/>
+            </p:nvSpPr>
+            <p:spPr>
+              <a:xfrm>
+                <a:off x="2150908" y="222868"/>
+                <a:ext cx="919298" cy="461665"/>
+              </a:xfrm>
+              <a:prstGeom prst="rect">
+                <a:avLst/>
+              </a:prstGeom>
+              <a:noFill/>
+            </p:spPr>
+            <p:txBody>
+              <a:bodyPr wrap="square" rtlCol="0">
+                <a:spAutoFit/>
+              </a:bodyPr>
+              <a:lstStyle/>
+              <a:p>
+                <a14:m>
+                  <m:oMath xmlns:m="http://schemas.openxmlformats.org/officeDocument/2006/math">
+                    <m:r>
+                      <a:rPr lang="en-US" sz="1200" b="0" i="1" smtClean="0">
+                        <a:latin typeface="Cambria Math" panose="02040503050406030204" pitchFamily="18" charset="0"/>
+                        <a:cs typeface="Times New Roman" panose="02020603050405020304" pitchFamily="18" charset="0"/>
+                      </a:rPr>
+                      <m:t>𝐷𝑒𝑙𝑡𝑎</m:t>
+                    </m:r>
+                  </m:oMath>
+                </a14:m>
+                <a:r>
+                  <a:rPr lang="en-US" sz="1200" dirty="0">
+                    <a:latin typeface="Times New Roman" panose="02020603050405020304" pitchFamily="18" charset="0"/>
+                    <a:cs typeface="Times New Roman" panose="02020603050405020304" pitchFamily="18" charset="0"/>
+                  </a:rPr>
+                  <a:t> 3MHz</a:t>
+                </a:r>
+              </a:p>
+            </p:txBody>
+          </p:sp>
+        </mc:Choice>
+        <mc:Fallback xmlns="">
+          <p:sp>
+            <p:nvSpPr>
+              <p:cNvPr id="16" name="TextBox 15">
+                <a:extLst>
+                  <a:ext uri="{FF2B5EF4-FFF2-40B4-BE49-F238E27FC236}">
+                    <a16:creationId xmlns:a16="http://schemas.microsoft.com/office/drawing/2014/main" id="{AFD4A126-468B-C8CC-0A4B-0933C60B34B5}"/>
+                  </a:ext>
+                </a:extLst>
+              </p:cNvPr>
+              <p:cNvSpPr txBox="1">
+                <a:spLocks noRot="1" noChangeAspect="1" noMove="1" noResize="1" noEditPoints="1" noAdjustHandles="1" noChangeArrowheads="1" noChangeShapeType="1" noTextEdit="1"/>
+              </p:cNvSpPr>
+              <p:nvPr/>
+            </p:nvSpPr>
+            <p:spPr>
+              <a:xfrm>
+                <a:off x="2150908" y="222868"/>
+                <a:ext cx="919298" cy="461665"/>
+              </a:xfrm>
+              <a:prstGeom prst="rect">
+                <a:avLst/>
+              </a:prstGeom>
+              <a:blipFill>
+                <a:blip r:embed="rId4"/>
+                <a:stretch>
+                  <a:fillRect b="-10811"/>
+                </a:stretch>
+              </a:blipFill>
+            </p:spPr>
+            <p:txBody>
+              <a:bodyPr/>
+              <a:lstStyle/>
+              <a:p>
+                <a:r>
+                  <a:rPr lang="en-US">
+                    <a:noFill/>
+                  </a:rPr>
+                  <a:t> </a:t>
+                </a:r>
+              </a:p>
+            </p:txBody>
+          </p:sp>
+        </mc:Fallback>
+      </mc:AlternateContent>
+      <mc:AlternateContent xmlns:mc="http://schemas.openxmlformats.org/markup-compatibility/2006" xmlns:a14="http://schemas.microsoft.com/office/drawing/2010/main">
+        <mc:Choice Requires="a14">
+          <p:sp>
+            <p:nvSpPr>
+              <p:cNvPr id="17" name="TextBox 16">
+                <a:extLst>
+                  <a:ext uri="{FF2B5EF4-FFF2-40B4-BE49-F238E27FC236}">
+                    <a16:creationId xmlns:a16="http://schemas.microsoft.com/office/drawing/2014/main" id="{BFBF19AC-6784-853A-D55F-9AC35EA18C77}"/>
+                  </a:ext>
+                </a:extLst>
+              </p:cNvPr>
+              <p:cNvSpPr txBox="1"/>
+              <p:nvPr/>
+            </p:nvSpPr>
+            <p:spPr>
+              <a:xfrm>
+                <a:off x="5287724" y="216812"/>
+                <a:ext cx="919298" cy="461665"/>
+              </a:xfrm>
+              <a:prstGeom prst="rect">
+                <a:avLst/>
+              </a:prstGeom>
+              <a:noFill/>
+            </p:spPr>
+            <p:txBody>
+              <a:bodyPr wrap="square" rtlCol="0">
+                <a:spAutoFit/>
+              </a:bodyPr>
+              <a:lstStyle/>
+              <a:p>
+                <a14:m>
+                  <m:oMath xmlns:m="http://schemas.openxmlformats.org/officeDocument/2006/math">
+                    <m:r>
+                      <a:rPr lang="en-US" sz="1200" b="0" i="1" smtClean="0">
+                        <a:latin typeface="Cambria Math" panose="02040503050406030204" pitchFamily="18" charset="0"/>
+                        <a:cs typeface="Times New Roman" panose="02020603050405020304" pitchFamily="18" charset="0"/>
+                      </a:rPr>
+                      <m:t>𝐷𝑒𝑙𝑡𝑎</m:t>
+                    </m:r>
+                  </m:oMath>
+                </a14:m>
+                <a:r>
+                  <a:rPr lang="en-US" sz="1200" dirty="0">
+                    <a:latin typeface="Times New Roman" panose="02020603050405020304" pitchFamily="18" charset="0"/>
+                    <a:cs typeface="Times New Roman" panose="02020603050405020304" pitchFamily="18" charset="0"/>
+                  </a:rPr>
+                  <a:t> 1MHz</a:t>
+                </a:r>
+              </a:p>
+            </p:txBody>
+          </p:sp>
+        </mc:Choice>
+        <mc:Fallback xmlns="">
+          <p:sp>
+            <p:nvSpPr>
+              <p:cNvPr id="17" name="TextBox 16">
+                <a:extLst>
+                  <a:ext uri="{FF2B5EF4-FFF2-40B4-BE49-F238E27FC236}">
+                    <a16:creationId xmlns:a16="http://schemas.microsoft.com/office/drawing/2014/main" id="{BFBF19AC-6784-853A-D55F-9AC35EA18C77}"/>
+                  </a:ext>
+                </a:extLst>
+              </p:cNvPr>
+              <p:cNvSpPr txBox="1">
+                <a:spLocks noRot="1" noChangeAspect="1" noMove="1" noResize="1" noEditPoints="1" noAdjustHandles="1" noChangeArrowheads="1" noChangeShapeType="1" noTextEdit="1"/>
+              </p:cNvSpPr>
+              <p:nvPr/>
+            </p:nvSpPr>
+            <p:spPr>
+              <a:xfrm>
+                <a:off x="5287724" y="216812"/>
+                <a:ext cx="919298" cy="461665"/>
+              </a:xfrm>
+              <a:prstGeom prst="rect">
+                <a:avLst/>
+              </a:prstGeom>
+              <a:blipFill>
+                <a:blip r:embed="rId5"/>
+                <a:stretch>
+                  <a:fillRect b="-10811"/>
+                </a:stretch>
+              </a:blipFill>
+            </p:spPr>
+            <p:txBody>
+              <a:bodyPr/>
+              <a:lstStyle/>
+              <a:p>
+                <a:r>
+                  <a:rPr lang="en-US">
+                    <a:noFill/>
+                  </a:rPr>
+                  <a:t> </a:t>
+                </a:r>
+              </a:p>
+            </p:txBody>
+          </p:sp>
+        </mc:Fallback>
+      </mc:AlternateContent>
+      <mc:AlternateContent xmlns:mc="http://schemas.openxmlformats.org/markup-compatibility/2006" xmlns:a14="http://schemas.microsoft.com/office/drawing/2010/main">
+        <mc:Choice Requires="a14">
+          <p:sp>
+            <p:nvSpPr>
+              <p:cNvPr id="18" name="TextBox 17">
+                <a:extLst>
+                  <a:ext uri="{FF2B5EF4-FFF2-40B4-BE49-F238E27FC236}">
+                    <a16:creationId xmlns:a16="http://schemas.microsoft.com/office/drawing/2014/main" id="{E542CB79-9718-4738-E2B1-316791AFDF33}"/>
+                  </a:ext>
+                </a:extLst>
+              </p:cNvPr>
+              <p:cNvSpPr txBox="1"/>
+              <p:nvPr/>
+            </p:nvSpPr>
+            <p:spPr>
+              <a:xfrm>
+                <a:off x="8975602" y="168367"/>
+                <a:ext cx="919298" cy="461665"/>
+              </a:xfrm>
+              <a:prstGeom prst="rect">
+                <a:avLst/>
+              </a:prstGeom>
+              <a:noFill/>
+            </p:spPr>
+            <p:txBody>
+              <a:bodyPr wrap="square" rtlCol="0">
+                <a:spAutoFit/>
+              </a:bodyPr>
+              <a:lstStyle/>
+              <a:p>
+                <a14:m>
+                  <m:oMath xmlns:m="http://schemas.openxmlformats.org/officeDocument/2006/math">
+                    <m:r>
+                      <a:rPr lang="en-US" sz="1200" b="0" i="1" smtClean="0">
+                        <a:latin typeface="Cambria Math" panose="02040503050406030204" pitchFamily="18" charset="0"/>
+                        <a:cs typeface="Times New Roman" panose="02020603050405020304" pitchFamily="18" charset="0"/>
+                      </a:rPr>
+                      <m:t>𝐷𝑒𝑙𝑡𝑎</m:t>
+                    </m:r>
+                  </m:oMath>
+                </a14:m>
+                <a:r>
+                  <a:rPr lang="en-US" sz="1200" dirty="0">
+                    <a:latin typeface="Times New Roman" panose="02020603050405020304" pitchFamily="18" charset="0"/>
+                    <a:cs typeface="Times New Roman" panose="02020603050405020304" pitchFamily="18" charset="0"/>
+                  </a:rPr>
+                  <a:t> 0MHz</a:t>
+                </a:r>
+              </a:p>
+            </p:txBody>
+          </p:sp>
+        </mc:Choice>
+        <mc:Fallback xmlns="">
+          <p:sp>
+            <p:nvSpPr>
+              <p:cNvPr id="18" name="TextBox 17">
+                <a:extLst>
+                  <a:ext uri="{FF2B5EF4-FFF2-40B4-BE49-F238E27FC236}">
+                    <a16:creationId xmlns:a16="http://schemas.microsoft.com/office/drawing/2014/main" id="{E542CB79-9718-4738-E2B1-316791AFDF33}"/>
+                  </a:ext>
+                </a:extLst>
+              </p:cNvPr>
+              <p:cNvSpPr txBox="1">
+                <a:spLocks noRot="1" noChangeAspect="1" noMove="1" noResize="1" noEditPoints="1" noAdjustHandles="1" noChangeArrowheads="1" noChangeShapeType="1" noTextEdit="1"/>
+              </p:cNvSpPr>
+              <p:nvPr/>
+            </p:nvSpPr>
+            <p:spPr>
+              <a:xfrm>
+                <a:off x="8975602" y="168367"/>
+                <a:ext cx="919298" cy="461665"/>
+              </a:xfrm>
+              <a:prstGeom prst="rect">
+                <a:avLst/>
+              </a:prstGeom>
+              <a:blipFill>
+                <a:blip r:embed="rId6"/>
+                <a:stretch>
+                  <a:fillRect b="-10811"/>
+                </a:stretch>
+              </a:blipFill>
+            </p:spPr>
+            <p:txBody>
+              <a:bodyPr/>
+              <a:lstStyle/>
+              <a:p>
+                <a:r>
+                  <a:rPr lang="en-US">
+                    <a:noFill/>
+                  </a:rPr>
+                  <a:t> </a:t>
+                </a:r>
+              </a:p>
+            </p:txBody>
+          </p:sp>
+        </mc:Fallback>
+      </mc:AlternateContent>
+      <p:grpSp>
+        <p:nvGrpSpPr>
+          <p:cNvPr id="43" name="Group 42">
+            <a:extLst>
+              <a:ext uri="{FF2B5EF4-FFF2-40B4-BE49-F238E27FC236}">
+                <a16:creationId xmlns:a16="http://schemas.microsoft.com/office/drawing/2014/main" id="{44A0E7D7-1D63-984D-D281-5269F857B3AC}"/>
+              </a:ext>
+            </a:extLst>
+          </p:cNvPr>
+          <p:cNvGrpSpPr/>
+          <p:nvPr/>
+        </p:nvGrpSpPr>
+        <p:grpSpPr>
+          <a:xfrm>
+            <a:off x="1511213" y="1061413"/>
+            <a:ext cx="9259595" cy="5018951"/>
+            <a:chOff x="1511213" y="1061413"/>
+            <a:chExt cx="9259595" cy="5018951"/>
+          </a:xfrm>
+        </p:grpSpPr>
+        <p:pic>
+          <p:nvPicPr>
+            <p:cNvPr id="3" name="Picture 2">
+              <a:extLst>
+                <a:ext uri="{FF2B5EF4-FFF2-40B4-BE49-F238E27FC236}">
+                  <a16:creationId xmlns:a16="http://schemas.microsoft.com/office/drawing/2014/main" id="{62B786BA-25DE-FAC3-832D-2ED9880C75CF}"/>
+                </a:ext>
+              </a:extLst>
+            </p:cNvPr>
+            <p:cNvPicPr>
+              <a:picLocks noChangeAspect="1"/>
+            </p:cNvPicPr>
+            <p:nvPr/>
+          </p:nvPicPr>
+          <p:blipFill>
+            <a:blip r:embed="rId7"/>
+            <a:srcRect l="4520" b="5346"/>
+            <a:stretch/>
+          </p:blipFill>
+          <p:spPr>
+            <a:xfrm>
+              <a:off x="7704776" y="1061413"/>
+              <a:ext cx="3066032" cy="2417900"/>
+            </a:xfrm>
+            <a:prstGeom prst="rect">
+              <a:avLst/>
+            </a:prstGeom>
+          </p:spPr>
+        </p:pic>
+        <p:pic>
+          <p:nvPicPr>
+            <p:cNvPr id="5" name="Picture 4">
+              <a:extLst>
+                <a:ext uri="{FF2B5EF4-FFF2-40B4-BE49-F238E27FC236}">
+                  <a16:creationId xmlns:a16="http://schemas.microsoft.com/office/drawing/2014/main" id="{0B4A4098-DE27-81BD-F8A9-C034E174713F}"/>
+                </a:ext>
+              </a:extLst>
+            </p:cNvPr>
+            <p:cNvPicPr>
+              <a:picLocks noChangeAspect="1"/>
+            </p:cNvPicPr>
+            <p:nvPr/>
+          </p:nvPicPr>
+          <p:blipFill>
+            <a:blip r:embed="rId8"/>
+            <a:srcRect l="4588"/>
+            <a:stretch/>
+          </p:blipFill>
+          <p:spPr>
+            <a:xfrm>
+              <a:off x="7786392" y="3525888"/>
+              <a:ext cx="2984416" cy="2554475"/>
+            </a:xfrm>
+            <a:prstGeom prst="rect">
+              <a:avLst/>
+            </a:prstGeom>
+          </p:spPr>
+        </p:pic>
+        <p:pic>
+          <p:nvPicPr>
+            <p:cNvPr id="7" name="Picture 6">
+              <a:extLst>
+                <a:ext uri="{FF2B5EF4-FFF2-40B4-BE49-F238E27FC236}">
+                  <a16:creationId xmlns:a16="http://schemas.microsoft.com/office/drawing/2014/main" id="{08236112-9DC1-C00A-0EFD-68060A797832}"/>
+                </a:ext>
+              </a:extLst>
+            </p:cNvPr>
+            <p:cNvPicPr>
+              <a:picLocks noChangeAspect="1"/>
+            </p:cNvPicPr>
+            <p:nvPr/>
+          </p:nvPicPr>
+          <p:blipFill>
+            <a:blip r:embed="rId9"/>
+            <a:srcRect l="4467"/>
+            <a:stretch/>
+          </p:blipFill>
+          <p:spPr>
+            <a:xfrm>
+              <a:off x="4711280" y="3525890"/>
+              <a:ext cx="2914772" cy="2554474"/>
+            </a:xfrm>
+            <a:prstGeom prst="rect">
+              <a:avLst/>
+            </a:prstGeom>
+          </p:spPr>
+        </p:pic>
+        <p:pic>
+          <p:nvPicPr>
+            <p:cNvPr id="9" name="Picture 8">
+              <a:extLst>
+                <a:ext uri="{FF2B5EF4-FFF2-40B4-BE49-F238E27FC236}">
+                  <a16:creationId xmlns:a16="http://schemas.microsoft.com/office/drawing/2014/main" id="{658D1C0A-B8AC-000A-0B35-EE6E30AE743A}"/>
+                </a:ext>
+              </a:extLst>
+            </p:cNvPr>
+            <p:cNvPicPr>
+              <a:picLocks noChangeAspect="1"/>
+            </p:cNvPicPr>
+            <p:nvPr/>
+          </p:nvPicPr>
+          <p:blipFill>
+            <a:blip r:embed="rId10"/>
+            <a:srcRect l="4744" b="5788"/>
+            <a:stretch/>
+          </p:blipFill>
+          <p:spPr>
+            <a:xfrm>
+              <a:off x="4711280" y="1061413"/>
+              <a:ext cx="2914772" cy="2406618"/>
+            </a:xfrm>
+            <a:prstGeom prst="rect">
+              <a:avLst/>
+            </a:prstGeom>
+          </p:spPr>
+        </p:pic>
+        <p:pic>
+          <p:nvPicPr>
+            <p:cNvPr id="11" name="Picture 10">
+              <a:extLst>
+                <a:ext uri="{FF2B5EF4-FFF2-40B4-BE49-F238E27FC236}">
+                  <a16:creationId xmlns:a16="http://schemas.microsoft.com/office/drawing/2014/main" id="{00DC26D0-267A-24E9-4DD4-FB2E5CDBC3BF}"/>
+                </a:ext>
+              </a:extLst>
+            </p:cNvPr>
+            <p:cNvPicPr>
+              <a:picLocks noChangeAspect="1"/>
+            </p:cNvPicPr>
+            <p:nvPr/>
+          </p:nvPicPr>
+          <p:blipFill>
+            <a:blip r:embed="rId11"/>
+            <a:stretch>
+              <a:fillRect/>
+            </a:stretch>
+          </p:blipFill>
+          <p:spPr>
+            <a:xfrm>
+              <a:off x="1517328" y="3525889"/>
+              <a:ext cx="3047608" cy="2554475"/>
+            </a:xfrm>
+            <a:prstGeom prst="rect">
+              <a:avLst/>
+            </a:prstGeom>
+          </p:spPr>
+        </p:pic>
+        <p:pic>
+          <p:nvPicPr>
+            <p:cNvPr id="13" name="Picture 12">
+              <a:extLst>
+                <a:ext uri="{FF2B5EF4-FFF2-40B4-BE49-F238E27FC236}">
+                  <a16:creationId xmlns:a16="http://schemas.microsoft.com/office/drawing/2014/main" id="{D6A1A31F-7AAF-A5A0-9E1F-240A77F41C18}"/>
+                </a:ext>
+              </a:extLst>
+            </p:cNvPr>
+            <p:cNvPicPr>
+              <a:picLocks noChangeAspect="1"/>
+            </p:cNvPicPr>
+            <p:nvPr/>
+          </p:nvPicPr>
+          <p:blipFill>
+            <a:blip r:embed="rId12"/>
+            <a:srcRect b="5977"/>
+            <a:stretch/>
+          </p:blipFill>
+          <p:spPr>
+            <a:xfrm>
+              <a:off x="1511213" y="1061413"/>
+              <a:ext cx="3053723" cy="2406618"/>
+            </a:xfrm>
+            <a:prstGeom prst="rect">
+              <a:avLst/>
+            </a:prstGeom>
+          </p:spPr>
+        </p:pic>
+        <p:grpSp>
+          <p:nvGrpSpPr>
+            <p:cNvPr id="23" name="Group 22">
+              <a:extLst>
+                <a:ext uri="{FF2B5EF4-FFF2-40B4-BE49-F238E27FC236}">
+                  <a16:creationId xmlns:a16="http://schemas.microsoft.com/office/drawing/2014/main" id="{ED091ECE-2603-99EE-A361-3F67658B7D9C}"/>
+                </a:ext>
+              </a:extLst>
+            </p:cNvPr>
+            <p:cNvGrpSpPr/>
+            <p:nvPr/>
+          </p:nvGrpSpPr>
+          <p:grpSpPr>
+            <a:xfrm>
+              <a:off x="1940584" y="2723739"/>
+              <a:ext cx="1557554" cy="473356"/>
+              <a:chOff x="1308945" y="2402792"/>
+              <a:chExt cx="1557554" cy="473356"/>
+            </a:xfrm>
+          </p:grpSpPr>
+          <mc:AlternateContent xmlns:mc="http://schemas.openxmlformats.org/markup-compatibility/2006" xmlns:a14="http://schemas.microsoft.com/office/drawing/2010/main">
+            <mc:Choice Requires="a14">
+              <p:sp>
+                <p:nvSpPr>
+                  <p:cNvPr id="19" name="TextBox 18">
+                    <a:extLst>
+                      <a:ext uri="{FF2B5EF4-FFF2-40B4-BE49-F238E27FC236}">
+                        <a16:creationId xmlns:a16="http://schemas.microsoft.com/office/drawing/2014/main" id="{26F6E5BF-0EEB-E250-664F-9906A8A6E6BD}"/>
+                      </a:ext>
+                    </a:extLst>
+                  </p:cNvPr>
+                  <p:cNvSpPr txBox="1"/>
+                  <p:nvPr/>
+                </p:nvSpPr>
+                <p:spPr>
+                  <a:xfrm>
+                    <a:off x="1321056" y="2402792"/>
+                    <a:ext cx="1545443" cy="276999"/>
+                  </a:xfrm>
+                  <a:prstGeom prst="rect">
+                    <a:avLst/>
+                  </a:prstGeom>
+                  <a:noFill/>
+                </p:spPr>
+                <p:txBody>
+                  <a:bodyPr wrap="square" rtlCol="0">
+                    <a:spAutoFit/>
+                  </a:bodyPr>
+                  <a:lstStyle/>
+                  <a:p>
+                    <a14:m>
+                      <m:oMath xmlns:m="http://schemas.openxmlformats.org/officeDocument/2006/math">
+                        <m:sSub>
+                          <m:sSubPr>
+                            <m:ctrlPr>
+                              <a:rPr lang="en-US" sz="1200" i="1" smtClean="0">
+                                <a:latin typeface="Cambria Math" panose="02040503050406030204" pitchFamily="18" charset="0"/>
+                                <a:ea typeface="Cambria Math" panose="02040503050406030204" pitchFamily="18" charset="0"/>
+                                <a:cs typeface="Times New Roman" panose="02020603050405020304" pitchFamily="18" charset="0"/>
+                              </a:rPr>
+                            </m:ctrlPr>
+                          </m:sSubPr>
+                          <m:e>
+                            <m:r>
+                              <a:rPr lang="en-US" sz="1200" i="1">
+                                <a:latin typeface="Cambria Math" panose="02040503050406030204" pitchFamily="18" charset="0"/>
+                                <a:ea typeface="Cambria Math" panose="02040503050406030204" pitchFamily="18" charset="0"/>
+                                <a:cs typeface="Times New Roman" panose="02020603050405020304" pitchFamily="18" charset="0"/>
+                              </a:rPr>
+                              <m:t>𝛿</m:t>
+                            </m:r>
+                          </m:e>
+                          <m:sub>
+                            <m:r>
+                              <a:rPr lang="en-US" sz="1200" i="1">
+                                <a:latin typeface="Cambria Math" panose="02040503050406030204" pitchFamily="18" charset="0"/>
+                                <a:ea typeface="Cambria Math" panose="02040503050406030204" pitchFamily="18" charset="0"/>
+                                <a:cs typeface="Times New Roman" panose="02020603050405020304" pitchFamily="18" charset="0"/>
+                              </a:rPr>
+                              <m:t>𝐿</m:t>
+                            </m:r>
+                            <m:r>
+                              <a:rPr lang="en-US" sz="1200" i="1">
+                                <a:latin typeface="Cambria Math" panose="02040503050406030204" pitchFamily="18" charset="0"/>
+                                <a:ea typeface="Cambria Math" panose="02040503050406030204" pitchFamily="18" charset="0"/>
+                                <a:cs typeface="Times New Roman" panose="02020603050405020304" pitchFamily="18" charset="0"/>
+                              </a:rPr>
+                              <m:t>2</m:t>
+                            </m:r>
+                          </m:sub>
+                        </m:sSub>
+                        <m:r>
+                          <a:rPr lang="en-US" sz="1200" i="1">
+                            <a:latin typeface="Cambria Math" panose="02040503050406030204" pitchFamily="18" charset="0"/>
+                            <a:ea typeface="Cambria Math" panose="02040503050406030204" pitchFamily="18" charset="0"/>
+                            <a:cs typeface="Times New Roman" panose="02020603050405020304" pitchFamily="18" charset="0"/>
+                          </a:rPr>
+                          <m:t>=</m:t>
+                        </m:r>
+                      </m:oMath>
+                    </a14:m>
+                    <a:r>
+                      <a:rPr lang="en-US" sz="1200" dirty="0">
+                        <a:latin typeface="Times New Roman" panose="02020603050405020304" pitchFamily="18" charset="0"/>
+                        <a:cs typeface="Times New Roman" panose="02020603050405020304" pitchFamily="18" charset="0"/>
+                      </a:rPr>
+                      <a:t> 3</a:t>
+                    </a:r>
+                    <a14:m>
+                      <m:oMath xmlns:m="http://schemas.openxmlformats.org/officeDocument/2006/math">
+                        <m:r>
+                          <a:rPr lang="en-US" sz="1200" i="1" smtClean="0">
+                            <a:latin typeface="Cambria Math" panose="02040503050406030204" pitchFamily="18" charset="0"/>
+                            <a:ea typeface="Cambria Math" panose="02040503050406030204" pitchFamily="18" charset="0"/>
+                            <a:cs typeface="Times New Roman" panose="02020603050405020304" pitchFamily="18" charset="0"/>
+                          </a:rPr>
+                          <m:t>×</m:t>
+                        </m:r>
+                      </m:oMath>
+                    </a14:m>
+                    <a:r>
+                      <a:rPr lang="en-US" sz="1200" dirty="0">
+                        <a:latin typeface="Times New Roman" panose="02020603050405020304" pitchFamily="18" charset="0"/>
+                        <a:cs typeface="Times New Roman" panose="02020603050405020304" pitchFamily="18" charset="0"/>
+                      </a:rPr>
+                      <a:t>2</a:t>
+                    </a:r>
+                    <a14:m>
+                      <m:oMath xmlns:m="http://schemas.openxmlformats.org/officeDocument/2006/math">
+                        <m:r>
+                          <a:rPr lang="en-US" sz="1200" i="1" smtClean="0">
+                            <a:latin typeface="Cambria Math" panose="02040503050406030204" pitchFamily="18" charset="0"/>
+                            <a:ea typeface="Cambria Math" panose="02040503050406030204" pitchFamily="18" charset="0"/>
+                            <a:cs typeface="Times New Roman" panose="02020603050405020304" pitchFamily="18" charset="0"/>
+                          </a:rPr>
+                          <m:t>𝜋</m:t>
+                        </m:r>
+                        <m:r>
+                          <a:rPr lang="en-US" sz="1200" i="1">
+                            <a:latin typeface="Cambria Math" panose="02040503050406030204" pitchFamily="18" charset="0"/>
+                            <a:ea typeface="Cambria Math" panose="02040503050406030204" pitchFamily="18" charset="0"/>
+                            <a:cs typeface="Times New Roman" panose="02020603050405020304" pitchFamily="18" charset="0"/>
+                          </a:rPr>
+                          <m:t> </m:t>
+                        </m:r>
+                      </m:oMath>
+                    </a14:m>
+                    <a:r>
+                      <a:rPr lang="en-US" sz="1200" dirty="0">
+                        <a:latin typeface="Times New Roman" panose="02020603050405020304" pitchFamily="18" charset="0"/>
+                        <a:cs typeface="Times New Roman" panose="02020603050405020304" pitchFamily="18" charset="0"/>
+                      </a:rPr>
+                      <a:t>MHz</a:t>
+                    </a:r>
+                  </a:p>
+                </p:txBody>
+              </p:sp>
+            </mc:Choice>
+            <mc:Fallback xmlns="">
+              <p:sp>
+                <p:nvSpPr>
+                  <p:cNvPr id="19" name="TextBox 18">
+                    <a:extLst>
+                      <a:ext uri="{FF2B5EF4-FFF2-40B4-BE49-F238E27FC236}">
+                        <a16:creationId xmlns:a16="http://schemas.microsoft.com/office/drawing/2014/main" id="{26F6E5BF-0EEB-E250-664F-9906A8A6E6BD}"/>
+                      </a:ext>
+                    </a:extLst>
+                  </p:cNvPr>
+                  <p:cNvSpPr txBox="1">
+                    <a:spLocks noRot="1" noChangeAspect="1" noMove="1" noResize="1" noEditPoints="1" noAdjustHandles="1" noChangeArrowheads="1" noChangeShapeType="1" noTextEdit="1"/>
+                  </p:cNvSpPr>
+                  <p:nvPr/>
+                </p:nvSpPr>
+                <p:spPr>
+                  <a:xfrm>
+                    <a:off x="1321056" y="2402792"/>
+                    <a:ext cx="1545443" cy="276999"/>
+                  </a:xfrm>
+                  <a:prstGeom prst="rect">
+                    <a:avLst/>
+                  </a:prstGeom>
+                  <a:blipFill>
+                    <a:blip r:embed="rId13"/>
+                    <a:stretch>
+                      <a:fillRect b="-17391"/>
+                    </a:stretch>
+                  </a:blipFill>
+                </p:spPr>
+                <p:txBody>
+                  <a:bodyPr/>
+                  <a:lstStyle/>
+                  <a:p>
+                    <a:r>
+                      <a:rPr lang="en-US">
+                        <a:noFill/>
+                      </a:rPr>
+                      <a:t> </a:t>
+                    </a:r>
+                  </a:p>
+                </p:txBody>
+              </p:sp>
+            </mc:Fallback>
+          </mc:AlternateContent>
+          <mc:AlternateContent xmlns:mc="http://schemas.openxmlformats.org/markup-compatibility/2006" xmlns:a14="http://schemas.microsoft.com/office/drawing/2010/main">
+            <mc:Choice Requires="a14">
+              <p:sp>
+                <p:nvSpPr>
+                  <p:cNvPr id="22" name="TextBox 21">
+                    <a:extLst>
+                      <a:ext uri="{FF2B5EF4-FFF2-40B4-BE49-F238E27FC236}">
+                        <a16:creationId xmlns:a16="http://schemas.microsoft.com/office/drawing/2014/main" id="{A225772D-60AB-E882-3A17-70D2AF5BE76D}"/>
+                      </a:ext>
+                    </a:extLst>
+                  </p:cNvPr>
+                  <p:cNvSpPr txBox="1"/>
+                  <p:nvPr/>
+                </p:nvSpPr>
+                <p:spPr>
+                  <a:xfrm>
+                    <a:off x="1308945" y="2599149"/>
+                    <a:ext cx="1196813" cy="276999"/>
+                  </a:xfrm>
+                  <a:prstGeom prst="rect">
+                    <a:avLst/>
+                  </a:prstGeom>
+                  <a:noFill/>
+                </p:spPr>
+                <p:txBody>
+                  <a:bodyPr wrap="square" rtlCol="0">
+                    <a:spAutoFit/>
+                  </a:bodyPr>
+                  <a:lstStyle/>
+                  <a:p>
+                    <a14:m>
+                      <m:oMath xmlns:m="http://schemas.openxmlformats.org/officeDocument/2006/math">
+                        <m:sSub>
+                          <m:sSubPr>
+                            <m:ctrlPr>
+                              <a:rPr lang="en-US" sz="1200" i="1" smtClean="0">
+                                <a:latin typeface="Cambria Math" panose="02040503050406030204" pitchFamily="18" charset="0"/>
+                                <a:ea typeface="Cambria Math" panose="02040503050406030204" pitchFamily="18" charset="0"/>
+                                <a:cs typeface="Times New Roman" panose="02020603050405020304" pitchFamily="18" charset="0"/>
+                              </a:rPr>
+                            </m:ctrlPr>
+                          </m:sSubPr>
+                          <m:e>
+                            <m:r>
+                              <a:rPr lang="en-US" sz="1200" i="1" smtClean="0">
+                                <a:latin typeface="Cambria Math" panose="02040503050406030204" pitchFamily="18" charset="0"/>
+                                <a:ea typeface="Cambria Math" panose="02040503050406030204" pitchFamily="18" charset="0"/>
+                                <a:cs typeface="Times New Roman" panose="02020603050405020304" pitchFamily="18" charset="0"/>
+                              </a:rPr>
+                              <m:t>ℰ</m:t>
+                            </m:r>
+                          </m:e>
+                          <m:sub>
+                            <m:r>
+                              <a:rPr lang="en-US" sz="1200" b="0" i="1" smtClean="0">
+                                <a:latin typeface="Cambria Math" panose="02040503050406030204" pitchFamily="18" charset="0"/>
+                                <a:ea typeface="Cambria Math" panose="02040503050406030204" pitchFamily="18" charset="0"/>
+                                <a:cs typeface="Times New Roman" panose="02020603050405020304" pitchFamily="18" charset="0"/>
+                              </a:rPr>
+                              <m:t>𝑛𝑟</m:t>
+                            </m:r>
+                          </m:sub>
+                        </m:sSub>
+                        <m:r>
+                          <a:rPr lang="en-US" sz="1200" i="1">
+                            <a:latin typeface="Cambria Math" panose="02040503050406030204" pitchFamily="18" charset="0"/>
+                            <a:ea typeface="Cambria Math" panose="02040503050406030204" pitchFamily="18" charset="0"/>
+                            <a:cs typeface="Times New Roman" panose="02020603050405020304" pitchFamily="18" charset="0"/>
+                          </a:rPr>
+                          <m:t>=</m:t>
+                        </m:r>
+                        <m:r>
+                          <a:rPr lang="en-US" sz="1200" b="0" i="1" smtClean="0">
+                            <a:latin typeface="Cambria Math" panose="02040503050406030204" pitchFamily="18" charset="0"/>
+                            <a:ea typeface="Cambria Math" panose="02040503050406030204" pitchFamily="18" charset="0"/>
+                            <a:cs typeface="Times New Roman" panose="02020603050405020304" pitchFamily="18" charset="0"/>
+                          </a:rPr>
+                          <m:t> </m:t>
+                        </m:r>
+                      </m:oMath>
+                    </a14:m>
+                    <a:r>
+                      <a:rPr lang="en-US" sz="1200" dirty="0">
+                        <a:latin typeface="Times New Roman" panose="02020603050405020304" pitchFamily="18" charset="0"/>
+                        <a:cs typeface="Times New Roman" panose="02020603050405020304" pitchFamily="18" charset="0"/>
+                      </a:rPr>
+                      <a:t>12V/m</a:t>
+                    </a:r>
+                  </a:p>
+                </p:txBody>
+              </p:sp>
+            </mc:Choice>
+            <mc:Fallback xmlns="">
+              <p:sp>
+                <p:nvSpPr>
+                  <p:cNvPr id="22" name="TextBox 21">
+                    <a:extLst>
+                      <a:ext uri="{FF2B5EF4-FFF2-40B4-BE49-F238E27FC236}">
+                        <a16:creationId xmlns:a16="http://schemas.microsoft.com/office/drawing/2014/main" id="{A225772D-60AB-E882-3A17-70D2AF5BE76D}"/>
+                      </a:ext>
+                    </a:extLst>
+                  </p:cNvPr>
+                  <p:cNvSpPr txBox="1">
+                    <a:spLocks noRot="1" noChangeAspect="1" noMove="1" noResize="1" noEditPoints="1" noAdjustHandles="1" noChangeArrowheads="1" noChangeShapeType="1" noTextEdit="1"/>
+                  </p:cNvSpPr>
+                  <p:nvPr/>
+                </p:nvSpPr>
+                <p:spPr>
+                  <a:xfrm>
+                    <a:off x="1308945" y="2599149"/>
+                    <a:ext cx="1196813" cy="276999"/>
+                  </a:xfrm>
+                  <a:prstGeom prst="rect">
+                    <a:avLst/>
+                  </a:prstGeom>
+                  <a:blipFill>
+                    <a:blip r:embed="rId14"/>
+                    <a:stretch>
+                      <a:fillRect b="-17391"/>
+                    </a:stretch>
+                  </a:blipFill>
+                </p:spPr>
+                <p:txBody>
+                  <a:bodyPr/>
+                  <a:lstStyle/>
+                  <a:p>
+                    <a:r>
+                      <a:rPr lang="en-US">
+                        <a:noFill/>
+                      </a:rPr>
+                      <a:t> </a:t>
+                    </a:r>
+                  </a:p>
+                </p:txBody>
+              </p:sp>
+            </mc:Fallback>
+          </mc:AlternateContent>
+        </p:grpSp>
+        <p:grpSp>
+          <p:nvGrpSpPr>
+            <p:cNvPr id="24" name="Group 23">
+              <a:extLst>
+                <a:ext uri="{FF2B5EF4-FFF2-40B4-BE49-F238E27FC236}">
+                  <a16:creationId xmlns:a16="http://schemas.microsoft.com/office/drawing/2014/main" id="{BDBF303A-EDA6-99D8-C969-88713D3B7210}"/>
+                </a:ext>
+              </a:extLst>
+            </p:cNvPr>
+            <p:cNvGrpSpPr/>
+            <p:nvPr/>
+          </p:nvGrpSpPr>
+          <p:grpSpPr>
+            <a:xfrm>
+              <a:off x="4994307" y="2717678"/>
+              <a:ext cx="1418604" cy="473356"/>
+              <a:chOff x="1308945" y="2402792"/>
+              <a:chExt cx="1418604" cy="473356"/>
+            </a:xfrm>
+          </p:grpSpPr>
+          <mc:AlternateContent xmlns:mc="http://schemas.openxmlformats.org/markup-compatibility/2006" xmlns:a14="http://schemas.microsoft.com/office/drawing/2010/main">
+            <mc:Choice Requires="a14">
+              <p:sp>
+                <p:nvSpPr>
+                  <p:cNvPr id="25" name="TextBox 24">
+                    <a:extLst>
+                      <a:ext uri="{FF2B5EF4-FFF2-40B4-BE49-F238E27FC236}">
+                        <a16:creationId xmlns:a16="http://schemas.microsoft.com/office/drawing/2014/main" id="{53A295F0-2BB1-7E60-B0A0-F3F4BDB0C2FC}"/>
+                      </a:ext>
+                    </a:extLst>
+                  </p:cNvPr>
+                  <p:cNvSpPr txBox="1"/>
+                  <p:nvPr/>
+                </p:nvSpPr>
+                <p:spPr>
+                  <a:xfrm>
+                    <a:off x="1321056" y="2402792"/>
+                    <a:ext cx="1406493" cy="276999"/>
+                  </a:xfrm>
+                  <a:prstGeom prst="rect">
+                    <a:avLst/>
+                  </a:prstGeom>
+                  <a:noFill/>
+                </p:spPr>
+                <p:txBody>
+                  <a:bodyPr wrap="square" rtlCol="0">
+                    <a:spAutoFit/>
+                  </a:bodyPr>
+                  <a:lstStyle/>
+                  <a:p>
+                    <a14:m>
+                      <m:oMath xmlns:m="http://schemas.openxmlformats.org/officeDocument/2006/math">
+                        <m:sSub>
+                          <m:sSubPr>
+                            <m:ctrlPr>
+                              <a:rPr lang="en-US" sz="1200" i="1" smtClean="0">
+                                <a:latin typeface="Cambria Math" panose="02040503050406030204" pitchFamily="18" charset="0"/>
+                                <a:ea typeface="Cambria Math" panose="02040503050406030204" pitchFamily="18" charset="0"/>
+                                <a:cs typeface="Times New Roman" panose="02020603050405020304" pitchFamily="18" charset="0"/>
+                              </a:rPr>
+                            </m:ctrlPr>
+                          </m:sSubPr>
+                          <m:e>
+                            <m:r>
+                              <a:rPr lang="en-US" sz="1200" i="1">
+                                <a:latin typeface="Cambria Math" panose="02040503050406030204" pitchFamily="18" charset="0"/>
+                                <a:ea typeface="Cambria Math" panose="02040503050406030204" pitchFamily="18" charset="0"/>
+                                <a:cs typeface="Times New Roman" panose="02020603050405020304" pitchFamily="18" charset="0"/>
+                              </a:rPr>
+                              <m:t>𝛿</m:t>
+                            </m:r>
+                          </m:e>
+                          <m:sub>
+                            <m:r>
+                              <a:rPr lang="en-US" sz="1200" i="1">
+                                <a:latin typeface="Cambria Math" panose="02040503050406030204" pitchFamily="18" charset="0"/>
+                                <a:ea typeface="Cambria Math" panose="02040503050406030204" pitchFamily="18" charset="0"/>
+                                <a:cs typeface="Times New Roman" panose="02020603050405020304" pitchFamily="18" charset="0"/>
+                              </a:rPr>
+                              <m:t>𝐿</m:t>
+                            </m:r>
+                            <m:r>
+                              <a:rPr lang="en-US" sz="1200" i="1">
+                                <a:latin typeface="Cambria Math" panose="02040503050406030204" pitchFamily="18" charset="0"/>
+                                <a:ea typeface="Cambria Math" panose="02040503050406030204" pitchFamily="18" charset="0"/>
+                                <a:cs typeface="Times New Roman" panose="02020603050405020304" pitchFamily="18" charset="0"/>
+                              </a:rPr>
+                              <m:t>2</m:t>
+                            </m:r>
+                          </m:sub>
+                        </m:sSub>
+                        <m:r>
+                          <a:rPr lang="en-US" sz="1200" i="1">
+                            <a:latin typeface="Cambria Math" panose="02040503050406030204" pitchFamily="18" charset="0"/>
+                            <a:ea typeface="Cambria Math" panose="02040503050406030204" pitchFamily="18" charset="0"/>
+                            <a:cs typeface="Times New Roman" panose="02020603050405020304" pitchFamily="18" charset="0"/>
+                          </a:rPr>
+                          <m:t>=</m:t>
+                        </m:r>
+                        <m:r>
+                          <a:rPr lang="en-US" sz="1200" b="0" i="1" smtClean="0">
+                            <a:latin typeface="Cambria Math" panose="02040503050406030204" pitchFamily="18" charset="0"/>
+                            <a:ea typeface="Cambria Math" panose="02040503050406030204" pitchFamily="18" charset="0"/>
+                            <a:cs typeface="Times New Roman" panose="02020603050405020304" pitchFamily="18" charset="0"/>
+                          </a:rPr>
+                          <m:t> </m:t>
+                        </m:r>
+                      </m:oMath>
+                    </a14:m>
+                    <a:r>
+                      <a:rPr lang="en-US" sz="1200" dirty="0">
+                        <a:latin typeface="Times New Roman" panose="02020603050405020304" pitchFamily="18" charset="0"/>
+                        <a:cs typeface="Times New Roman" panose="02020603050405020304" pitchFamily="18" charset="0"/>
+                      </a:rPr>
+                      <a:t>1</a:t>
+                    </a:r>
+                    <a14:m>
+                      <m:oMath xmlns:m="http://schemas.openxmlformats.org/officeDocument/2006/math">
+                        <m:r>
+                          <a:rPr lang="en-US" sz="1200" i="1" smtClean="0">
+                            <a:latin typeface="Cambria Math" panose="02040503050406030204" pitchFamily="18" charset="0"/>
+                            <a:ea typeface="Cambria Math" panose="02040503050406030204" pitchFamily="18" charset="0"/>
+                            <a:cs typeface="Times New Roman" panose="02020603050405020304" pitchFamily="18" charset="0"/>
+                          </a:rPr>
+                          <m:t>×</m:t>
+                        </m:r>
+                      </m:oMath>
+                    </a14:m>
+                    <a:r>
+                      <a:rPr lang="en-US" sz="1200" dirty="0">
+                        <a:latin typeface="Times New Roman" panose="02020603050405020304" pitchFamily="18" charset="0"/>
+                        <a:cs typeface="Times New Roman" panose="02020603050405020304" pitchFamily="18" charset="0"/>
+                      </a:rPr>
+                      <a:t>2</a:t>
+                    </a:r>
+                    <a14:m>
+                      <m:oMath xmlns:m="http://schemas.openxmlformats.org/officeDocument/2006/math">
+                        <m:r>
+                          <a:rPr lang="en-US" sz="1200" i="1" smtClean="0">
+                            <a:latin typeface="Cambria Math" panose="02040503050406030204" pitchFamily="18" charset="0"/>
+                            <a:ea typeface="Cambria Math" panose="02040503050406030204" pitchFamily="18" charset="0"/>
+                            <a:cs typeface="Times New Roman" panose="02020603050405020304" pitchFamily="18" charset="0"/>
+                          </a:rPr>
+                          <m:t>𝜋</m:t>
+                        </m:r>
+                        <m:r>
+                          <a:rPr lang="en-US" sz="1200" i="1">
+                            <a:latin typeface="Cambria Math" panose="02040503050406030204" pitchFamily="18" charset="0"/>
+                            <a:ea typeface="Cambria Math" panose="02040503050406030204" pitchFamily="18" charset="0"/>
+                            <a:cs typeface="Times New Roman" panose="02020603050405020304" pitchFamily="18" charset="0"/>
+                          </a:rPr>
+                          <m:t> </m:t>
+                        </m:r>
+                      </m:oMath>
+                    </a14:m>
+                    <a:r>
+                      <a:rPr lang="en-US" sz="1200" dirty="0">
+                        <a:latin typeface="Times New Roman" panose="02020603050405020304" pitchFamily="18" charset="0"/>
+                        <a:cs typeface="Times New Roman" panose="02020603050405020304" pitchFamily="18" charset="0"/>
+                      </a:rPr>
+                      <a:t>MHz</a:t>
+                    </a:r>
+                  </a:p>
+                </p:txBody>
+              </p:sp>
+            </mc:Choice>
+            <mc:Fallback xmlns="">
+              <p:sp>
+                <p:nvSpPr>
+                  <p:cNvPr id="25" name="TextBox 24">
+                    <a:extLst>
+                      <a:ext uri="{FF2B5EF4-FFF2-40B4-BE49-F238E27FC236}">
+                        <a16:creationId xmlns:a16="http://schemas.microsoft.com/office/drawing/2014/main" id="{53A295F0-2BB1-7E60-B0A0-F3F4BDB0C2FC}"/>
+                      </a:ext>
+                    </a:extLst>
+                  </p:cNvPr>
+                  <p:cNvSpPr txBox="1">
+                    <a:spLocks noRot="1" noChangeAspect="1" noMove="1" noResize="1" noEditPoints="1" noAdjustHandles="1" noChangeArrowheads="1" noChangeShapeType="1" noTextEdit="1"/>
+                  </p:cNvSpPr>
+                  <p:nvPr/>
+                </p:nvSpPr>
+                <p:spPr>
+                  <a:xfrm>
+                    <a:off x="1321056" y="2402792"/>
+                    <a:ext cx="1406493" cy="276999"/>
+                  </a:xfrm>
+                  <a:prstGeom prst="rect">
+                    <a:avLst/>
+                  </a:prstGeom>
+                  <a:blipFill>
+                    <a:blip r:embed="rId15"/>
+                    <a:stretch>
+                      <a:fillRect b="-22727"/>
+                    </a:stretch>
+                  </a:blipFill>
+                </p:spPr>
+                <p:txBody>
+                  <a:bodyPr/>
+                  <a:lstStyle/>
+                  <a:p>
+                    <a:r>
+                      <a:rPr lang="en-US">
+                        <a:noFill/>
+                      </a:rPr>
+                      <a:t> </a:t>
+                    </a:r>
+                  </a:p>
+                </p:txBody>
+              </p:sp>
+            </mc:Fallback>
+          </mc:AlternateContent>
+          <mc:AlternateContent xmlns:mc="http://schemas.openxmlformats.org/markup-compatibility/2006" xmlns:a14="http://schemas.microsoft.com/office/drawing/2010/main">
+            <mc:Choice Requires="a14">
+              <p:sp>
+                <p:nvSpPr>
+                  <p:cNvPr id="26" name="TextBox 25">
+                    <a:extLst>
+                      <a:ext uri="{FF2B5EF4-FFF2-40B4-BE49-F238E27FC236}">
+                        <a16:creationId xmlns:a16="http://schemas.microsoft.com/office/drawing/2014/main" id="{FF7E13BD-DA92-8424-9F89-3659E3046A24}"/>
+                      </a:ext>
+                    </a:extLst>
+                  </p:cNvPr>
+                  <p:cNvSpPr txBox="1"/>
+                  <p:nvPr/>
+                </p:nvSpPr>
+                <p:spPr>
+                  <a:xfrm>
+                    <a:off x="1308945" y="2599149"/>
+                    <a:ext cx="1196813" cy="276999"/>
+                  </a:xfrm>
+                  <a:prstGeom prst="rect">
+                    <a:avLst/>
+                  </a:prstGeom>
+                  <a:noFill/>
+                </p:spPr>
+                <p:txBody>
+                  <a:bodyPr wrap="square" rtlCol="0">
+                    <a:spAutoFit/>
+                  </a:bodyPr>
+                  <a:lstStyle/>
+                  <a:p>
+                    <a14:m>
+                      <m:oMath xmlns:m="http://schemas.openxmlformats.org/officeDocument/2006/math">
+                        <m:sSub>
+                          <m:sSubPr>
+                            <m:ctrlPr>
+                              <a:rPr lang="en-US" sz="1200" i="1" smtClean="0">
+                                <a:latin typeface="Cambria Math" panose="02040503050406030204" pitchFamily="18" charset="0"/>
+                                <a:ea typeface="Cambria Math" panose="02040503050406030204" pitchFamily="18" charset="0"/>
+                                <a:cs typeface="Times New Roman" panose="02020603050405020304" pitchFamily="18" charset="0"/>
+                              </a:rPr>
+                            </m:ctrlPr>
+                          </m:sSubPr>
+                          <m:e>
+                            <m:r>
+                              <a:rPr lang="en-US" sz="1200" i="1" smtClean="0">
+                                <a:latin typeface="Cambria Math" panose="02040503050406030204" pitchFamily="18" charset="0"/>
+                                <a:ea typeface="Cambria Math" panose="02040503050406030204" pitchFamily="18" charset="0"/>
+                                <a:cs typeface="Times New Roman" panose="02020603050405020304" pitchFamily="18" charset="0"/>
+                              </a:rPr>
+                              <m:t>ℰ</m:t>
+                            </m:r>
+                          </m:e>
+                          <m:sub>
+                            <m:r>
+                              <a:rPr lang="en-US" sz="1200" b="0" i="1" smtClean="0">
+                                <a:latin typeface="Cambria Math" panose="02040503050406030204" pitchFamily="18" charset="0"/>
+                                <a:ea typeface="Cambria Math" panose="02040503050406030204" pitchFamily="18" charset="0"/>
+                                <a:cs typeface="Times New Roman" panose="02020603050405020304" pitchFamily="18" charset="0"/>
+                              </a:rPr>
+                              <m:t>𝑛𝑟</m:t>
+                            </m:r>
+                          </m:sub>
+                        </m:sSub>
+                        <m:r>
+                          <a:rPr lang="en-US" sz="1200" i="1">
+                            <a:latin typeface="Cambria Math" panose="02040503050406030204" pitchFamily="18" charset="0"/>
+                            <a:ea typeface="Cambria Math" panose="02040503050406030204" pitchFamily="18" charset="0"/>
+                            <a:cs typeface="Times New Roman" panose="02020603050405020304" pitchFamily="18" charset="0"/>
+                          </a:rPr>
+                          <m:t>=</m:t>
+                        </m:r>
+                        <m:r>
+                          <a:rPr lang="en-US" sz="1200" b="0" i="1" smtClean="0">
+                            <a:latin typeface="Cambria Math" panose="02040503050406030204" pitchFamily="18" charset="0"/>
+                            <a:ea typeface="Cambria Math" panose="02040503050406030204" pitchFamily="18" charset="0"/>
+                            <a:cs typeface="Times New Roman" panose="02020603050405020304" pitchFamily="18" charset="0"/>
+                          </a:rPr>
+                          <m:t> </m:t>
+                        </m:r>
+                      </m:oMath>
+                    </a14:m>
+                    <a:r>
+                      <a:rPr lang="en-US" sz="1200" dirty="0">
+                        <a:latin typeface="Times New Roman" panose="02020603050405020304" pitchFamily="18" charset="0"/>
+                        <a:cs typeface="Times New Roman" panose="02020603050405020304" pitchFamily="18" charset="0"/>
+                      </a:rPr>
+                      <a:t>12V/m</a:t>
+                    </a:r>
+                  </a:p>
+                </p:txBody>
+              </p:sp>
+            </mc:Choice>
+            <mc:Fallback xmlns="">
+              <p:sp>
+                <p:nvSpPr>
+                  <p:cNvPr id="26" name="TextBox 25">
+                    <a:extLst>
+                      <a:ext uri="{FF2B5EF4-FFF2-40B4-BE49-F238E27FC236}">
+                        <a16:creationId xmlns:a16="http://schemas.microsoft.com/office/drawing/2014/main" id="{FF7E13BD-DA92-8424-9F89-3659E3046A24}"/>
+                      </a:ext>
+                    </a:extLst>
+                  </p:cNvPr>
+                  <p:cNvSpPr txBox="1">
+                    <a:spLocks noRot="1" noChangeAspect="1" noMove="1" noResize="1" noEditPoints="1" noAdjustHandles="1" noChangeArrowheads="1" noChangeShapeType="1" noTextEdit="1"/>
+                  </p:cNvSpPr>
+                  <p:nvPr/>
+                </p:nvSpPr>
+                <p:spPr>
+                  <a:xfrm>
+                    <a:off x="1308945" y="2599149"/>
+                    <a:ext cx="1196813" cy="276999"/>
+                  </a:xfrm>
+                  <a:prstGeom prst="rect">
+                    <a:avLst/>
+                  </a:prstGeom>
+                  <a:blipFill>
+                    <a:blip r:embed="rId16"/>
+                    <a:stretch>
+                      <a:fillRect b="-17391"/>
+                    </a:stretch>
+                  </a:blipFill>
+                </p:spPr>
+                <p:txBody>
+                  <a:bodyPr/>
+                  <a:lstStyle/>
+                  <a:p>
+                    <a:r>
+                      <a:rPr lang="en-US">
+                        <a:noFill/>
+                      </a:rPr>
+                      <a:t> </a:t>
+                    </a:r>
+                  </a:p>
+                </p:txBody>
+              </p:sp>
+            </mc:Fallback>
+          </mc:AlternateContent>
+        </p:grpSp>
+        <p:grpSp>
+          <p:nvGrpSpPr>
+            <p:cNvPr id="27" name="Group 26">
+              <a:extLst>
+                <a:ext uri="{FF2B5EF4-FFF2-40B4-BE49-F238E27FC236}">
+                  <a16:creationId xmlns:a16="http://schemas.microsoft.com/office/drawing/2014/main" id="{EBE0A511-AFEE-3FC5-B9EC-5FF31F5C8D2D}"/>
+                </a:ext>
+              </a:extLst>
+            </p:cNvPr>
+            <p:cNvGrpSpPr/>
+            <p:nvPr/>
+          </p:nvGrpSpPr>
+          <p:grpSpPr>
+            <a:xfrm>
+              <a:off x="8147603" y="2388882"/>
+              <a:ext cx="1287648" cy="473356"/>
+              <a:chOff x="1308945" y="2402792"/>
+              <a:chExt cx="1287648" cy="473356"/>
+            </a:xfrm>
+          </p:grpSpPr>
+          <mc:AlternateContent xmlns:mc="http://schemas.openxmlformats.org/markup-compatibility/2006" xmlns:a14="http://schemas.microsoft.com/office/drawing/2010/main">
+            <mc:Choice Requires="a14">
+              <p:sp>
+                <p:nvSpPr>
+                  <p:cNvPr id="28" name="TextBox 27">
+                    <a:extLst>
+                      <a:ext uri="{FF2B5EF4-FFF2-40B4-BE49-F238E27FC236}">
+                        <a16:creationId xmlns:a16="http://schemas.microsoft.com/office/drawing/2014/main" id="{0AB3000E-3815-26A5-C066-D7C123AF6C3C}"/>
+                      </a:ext>
+                    </a:extLst>
+                  </p:cNvPr>
+                  <p:cNvSpPr txBox="1"/>
+                  <p:nvPr/>
+                </p:nvSpPr>
+                <p:spPr>
+                  <a:xfrm>
+                    <a:off x="1321057" y="2402792"/>
+                    <a:ext cx="1275536" cy="276999"/>
+                  </a:xfrm>
+                  <a:prstGeom prst="rect">
+                    <a:avLst/>
+                  </a:prstGeom>
+                  <a:noFill/>
+                </p:spPr>
+                <p:txBody>
+                  <a:bodyPr wrap="square" rtlCol="0">
+                    <a:spAutoFit/>
+                  </a:bodyPr>
+                  <a:lstStyle/>
+                  <a:p>
+                    <a14:m>
+                      <m:oMath xmlns:m="http://schemas.openxmlformats.org/officeDocument/2006/math">
+                        <m:sSub>
+                          <m:sSubPr>
+                            <m:ctrlPr>
+                              <a:rPr lang="en-US" sz="1200" i="1" smtClean="0">
+                                <a:latin typeface="Cambria Math" panose="02040503050406030204" pitchFamily="18" charset="0"/>
+                                <a:ea typeface="Cambria Math" panose="02040503050406030204" pitchFamily="18" charset="0"/>
+                                <a:cs typeface="Times New Roman" panose="02020603050405020304" pitchFamily="18" charset="0"/>
+                              </a:rPr>
+                            </m:ctrlPr>
+                          </m:sSubPr>
+                          <m:e>
+                            <m:r>
+                              <a:rPr lang="en-US" sz="1200" i="1">
+                                <a:latin typeface="Cambria Math" panose="02040503050406030204" pitchFamily="18" charset="0"/>
+                                <a:ea typeface="Cambria Math" panose="02040503050406030204" pitchFamily="18" charset="0"/>
+                                <a:cs typeface="Times New Roman" panose="02020603050405020304" pitchFamily="18" charset="0"/>
+                              </a:rPr>
+                              <m:t>𝛿</m:t>
+                            </m:r>
+                          </m:e>
+                          <m:sub>
+                            <m:r>
+                              <a:rPr lang="en-US" sz="1200" i="1">
+                                <a:latin typeface="Cambria Math" panose="02040503050406030204" pitchFamily="18" charset="0"/>
+                                <a:ea typeface="Cambria Math" panose="02040503050406030204" pitchFamily="18" charset="0"/>
+                                <a:cs typeface="Times New Roman" panose="02020603050405020304" pitchFamily="18" charset="0"/>
+                              </a:rPr>
+                              <m:t>𝐿</m:t>
+                            </m:r>
+                            <m:r>
+                              <a:rPr lang="en-US" sz="1200" i="1">
+                                <a:latin typeface="Cambria Math" panose="02040503050406030204" pitchFamily="18" charset="0"/>
+                                <a:ea typeface="Cambria Math" panose="02040503050406030204" pitchFamily="18" charset="0"/>
+                                <a:cs typeface="Times New Roman" panose="02020603050405020304" pitchFamily="18" charset="0"/>
+                              </a:rPr>
+                              <m:t>2</m:t>
+                            </m:r>
+                          </m:sub>
+                        </m:sSub>
+                        <m:r>
+                          <a:rPr lang="en-US" sz="1200" i="1">
+                            <a:latin typeface="Cambria Math" panose="02040503050406030204" pitchFamily="18" charset="0"/>
+                            <a:ea typeface="Cambria Math" panose="02040503050406030204" pitchFamily="18" charset="0"/>
+                            <a:cs typeface="Times New Roman" panose="02020603050405020304" pitchFamily="18" charset="0"/>
+                          </a:rPr>
+                          <m:t>=</m:t>
+                        </m:r>
+                      </m:oMath>
+                    </a14:m>
+                    <a:r>
+                      <a:rPr lang="en-US" sz="1200" dirty="0">
+                        <a:latin typeface="Times New Roman" panose="02020603050405020304" pitchFamily="18" charset="0"/>
+                        <a:cs typeface="Times New Roman" panose="02020603050405020304" pitchFamily="18" charset="0"/>
+                      </a:rPr>
+                      <a:t> 0 MHz</a:t>
+                    </a:r>
+                  </a:p>
+                </p:txBody>
+              </p:sp>
+            </mc:Choice>
+            <mc:Fallback xmlns="">
+              <p:sp>
+                <p:nvSpPr>
+                  <p:cNvPr id="28" name="TextBox 27">
+                    <a:extLst>
+                      <a:ext uri="{FF2B5EF4-FFF2-40B4-BE49-F238E27FC236}">
+                        <a16:creationId xmlns:a16="http://schemas.microsoft.com/office/drawing/2014/main" id="{0AB3000E-3815-26A5-C066-D7C123AF6C3C}"/>
+                      </a:ext>
+                    </a:extLst>
+                  </p:cNvPr>
+                  <p:cNvSpPr txBox="1">
+                    <a:spLocks noRot="1" noChangeAspect="1" noMove="1" noResize="1" noEditPoints="1" noAdjustHandles="1" noChangeArrowheads="1" noChangeShapeType="1" noTextEdit="1"/>
+                  </p:cNvSpPr>
+                  <p:nvPr/>
+                </p:nvSpPr>
+                <p:spPr>
+                  <a:xfrm>
+                    <a:off x="1321057" y="2402792"/>
+                    <a:ext cx="1275536" cy="276999"/>
+                  </a:xfrm>
+                  <a:prstGeom prst="rect">
+                    <a:avLst/>
+                  </a:prstGeom>
+                  <a:blipFill>
+                    <a:blip r:embed="rId17"/>
+                    <a:stretch>
+                      <a:fillRect b="-22727"/>
+                    </a:stretch>
+                  </a:blipFill>
+                </p:spPr>
+                <p:txBody>
+                  <a:bodyPr/>
+                  <a:lstStyle/>
+                  <a:p>
+                    <a:r>
+                      <a:rPr lang="en-US">
+                        <a:noFill/>
+                      </a:rPr>
+                      <a:t> </a:t>
+                    </a:r>
+                  </a:p>
+                </p:txBody>
+              </p:sp>
+            </mc:Fallback>
+          </mc:AlternateContent>
+          <mc:AlternateContent xmlns:mc="http://schemas.openxmlformats.org/markup-compatibility/2006" xmlns:a14="http://schemas.microsoft.com/office/drawing/2010/main">
+            <mc:Choice Requires="a14">
+              <p:sp>
+                <p:nvSpPr>
+                  <p:cNvPr id="29" name="TextBox 28">
+                    <a:extLst>
+                      <a:ext uri="{FF2B5EF4-FFF2-40B4-BE49-F238E27FC236}">
+                        <a16:creationId xmlns:a16="http://schemas.microsoft.com/office/drawing/2014/main" id="{0F78E2AA-88C4-95E6-5DFA-854A01E4BAF0}"/>
+                      </a:ext>
+                    </a:extLst>
+                  </p:cNvPr>
+                  <p:cNvSpPr txBox="1"/>
+                  <p:nvPr/>
+                </p:nvSpPr>
+                <p:spPr>
+                  <a:xfrm>
+                    <a:off x="1308945" y="2599149"/>
+                    <a:ext cx="1196813" cy="276999"/>
+                  </a:xfrm>
+                  <a:prstGeom prst="rect">
+                    <a:avLst/>
+                  </a:prstGeom>
+                  <a:noFill/>
+                </p:spPr>
+                <p:txBody>
+                  <a:bodyPr wrap="square" rtlCol="0">
+                    <a:spAutoFit/>
+                  </a:bodyPr>
+                  <a:lstStyle/>
+                  <a:p>
+                    <a14:m>
+                      <m:oMath xmlns:m="http://schemas.openxmlformats.org/officeDocument/2006/math">
+                        <m:sSub>
+                          <m:sSubPr>
+                            <m:ctrlPr>
+                              <a:rPr lang="en-US" sz="1200" i="1" smtClean="0">
+                                <a:latin typeface="Cambria Math" panose="02040503050406030204" pitchFamily="18" charset="0"/>
+                                <a:ea typeface="Cambria Math" panose="02040503050406030204" pitchFamily="18" charset="0"/>
+                                <a:cs typeface="Times New Roman" panose="02020603050405020304" pitchFamily="18" charset="0"/>
+                              </a:rPr>
+                            </m:ctrlPr>
+                          </m:sSubPr>
+                          <m:e>
+                            <m:r>
+                              <a:rPr lang="en-US" sz="1200" i="1" smtClean="0">
+                                <a:latin typeface="Cambria Math" panose="02040503050406030204" pitchFamily="18" charset="0"/>
+                                <a:ea typeface="Cambria Math" panose="02040503050406030204" pitchFamily="18" charset="0"/>
+                                <a:cs typeface="Times New Roman" panose="02020603050405020304" pitchFamily="18" charset="0"/>
+                              </a:rPr>
+                              <m:t>ℰ</m:t>
+                            </m:r>
+                          </m:e>
+                          <m:sub>
+                            <m:r>
+                              <a:rPr lang="en-US" sz="1200" b="0" i="1" smtClean="0">
+                                <a:latin typeface="Cambria Math" panose="02040503050406030204" pitchFamily="18" charset="0"/>
+                                <a:ea typeface="Cambria Math" panose="02040503050406030204" pitchFamily="18" charset="0"/>
+                                <a:cs typeface="Times New Roman" panose="02020603050405020304" pitchFamily="18" charset="0"/>
+                              </a:rPr>
+                              <m:t>𝑛𝑟</m:t>
+                            </m:r>
+                          </m:sub>
+                        </m:sSub>
+                        <m:r>
+                          <a:rPr lang="en-US" sz="1200" i="1">
+                            <a:latin typeface="Cambria Math" panose="02040503050406030204" pitchFamily="18" charset="0"/>
+                            <a:ea typeface="Cambria Math" panose="02040503050406030204" pitchFamily="18" charset="0"/>
+                            <a:cs typeface="Times New Roman" panose="02020603050405020304" pitchFamily="18" charset="0"/>
+                          </a:rPr>
+                          <m:t>=</m:t>
+                        </m:r>
+                      </m:oMath>
+                    </a14:m>
+                    <a:r>
+                      <a:rPr lang="en-US" sz="1200" dirty="0">
+                        <a:latin typeface="Times New Roman" panose="02020603050405020304" pitchFamily="18" charset="0"/>
+                        <a:cs typeface="Times New Roman" panose="02020603050405020304" pitchFamily="18" charset="0"/>
+                      </a:rPr>
+                      <a:t> 12V/m</a:t>
+                    </a:r>
+                  </a:p>
+                </p:txBody>
+              </p:sp>
+            </mc:Choice>
+            <mc:Fallback xmlns="">
+              <p:sp>
+                <p:nvSpPr>
+                  <p:cNvPr id="29" name="TextBox 28">
+                    <a:extLst>
+                      <a:ext uri="{FF2B5EF4-FFF2-40B4-BE49-F238E27FC236}">
+                        <a16:creationId xmlns:a16="http://schemas.microsoft.com/office/drawing/2014/main" id="{0F78E2AA-88C4-95E6-5DFA-854A01E4BAF0}"/>
+                      </a:ext>
+                    </a:extLst>
+                  </p:cNvPr>
+                  <p:cNvSpPr txBox="1">
+                    <a:spLocks noRot="1" noChangeAspect="1" noMove="1" noResize="1" noEditPoints="1" noAdjustHandles="1" noChangeArrowheads="1" noChangeShapeType="1" noTextEdit="1"/>
+                  </p:cNvSpPr>
+                  <p:nvPr/>
+                </p:nvSpPr>
+                <p:spPr>
+                  <a:xfrm>
+                    <a:off x="1308945" y="2599149"/>
+                    <a:ext cx="1196813" cy="276999"/>
+                  </a:xfrm>
+                  <a:prstGeom prst="rect">
+                    <a:avLst/>
+                  </a:prstGeom>
+                  <a:blipFill>
+                    <a:blip r:embed="rId18"/>
+                    <a:stretch>
+                      <a:fillRect b="-17391"/>
+                    </a:stretch>
+                  </a:blipFill>
+                </p:spPr>
+                <p:txBody>
+                  <a:bodyPr/>
+                  <a:lstStyle/>
+                  <a:p>
+                    <a:r>
+                      <a:rPr lang="en-US">
+                        <a:noFill/>
+                      </a:rPr>
+                      <a:t> </a:t>
+                    </a:r>
+                  </a:p>
+                </p:txBody>
+              </p:sp>
+            </mc:Fallback>
+          </mc:AlternateContent>
+        </p:grpSp>
+        <p:grpSp>
+          <p:nvGrpSpPr>
+            <p:cNvPr id="30" name="Group 29">
+              <a:extLst>
+                <a:ext uri="{FF2B5EF4-FFF2-40B4-BE49-F238E27FC236}">
+                  <a16:creationId xmlns:a16="http://schemas.microsoft.com/office/drawing/2014/main" id="{9BF0C266-C98B-F29C-2C69-55B9FFC81BDE}"/>
+                </a:ext>
+              </a:extLst>
+            </p:cNvPr>
+            <p:cNvGrpSpPr/>
+            <p:nvPr/>
+          </p:nvGrpSpPr>
+          <p:grpSpPr>
+            <a:xfrm>
+              <a:off x="8102185" y="4835895"/>
+              <a:ext cx="1287648" cy="473356"/>
+              <a:chOff x="1308945" y="2402792"/>
+              <a:chExt cx="1287648" cy="473356"/>
+            </a:xfrm>
+          </p:grpSpPr>
+          <mc:AlternateContent xmlns:mc="http://schemas.openxmlformats.org/markup-compatibility/2006" xmlns:a14="http://schemas.microsoft.com/office/drawing/2010/main">
+            <mc:Choice Requires="a14">
+              <p:sp>
+                <p:nvSpPr>
+                  <p:cNvPr id="31" name="TextBox 30">
+                    <a:extLst>
+                      <a:ext uri="{FF2B5EF4-FFF2-40B4-BE49-F238E27FC236}">
+                        <a16:creationId xmlns:a16="http://schemas.microsoft.com/office/drawing/2014/main" id="{E413DC9B-CA34-223B-D60F-7B2E7E689F3D}"/>
+                      </a:ext>
+                    </a:extLst>
+                  </p:cNvPr>
+                  <p:cNvSpPr txBox="1"/>
+                  <p:nvPr/>
+                </p:nvSpPr>
+                <p:spPr>
+                  <a:xfrm>
+                    <a:off x="1321057" y="2402792"/>
+                    <a:ext cx="1275536" cy="276999"/>
+                  </a:xfrm>
+                  <a:prstGeom prst="rect">
+                    <a:avLst/>
+                  </a:prstGeom>
+                  <a:noFill/>
+                </p:spPr>
+                <p:txBody>
+                  <a:bodyPr wrap="square" rtlCol="0">
+                    <a:spAutoFit/>
+                  </a:bodyPr>
+                  <a:lstStyle/>
+                  <a:p>
+                    <a14:m>
+                      <m:oMath xmlns:m="http://schemas.openxmlformats.org/officeDocument/2006/math">
+                        <m:sSub>
+                          <m:sSubPr>
+                            <m:ctrlPr>
+                              <a:rPr lang="en-US" sz="1200" i="1" smtClean="0">
+                                <a:latin typeface="Cambria Math" panose="02040503050406030204" pitchFamily="18" charset="0"/>
+                                <a:ea typeface="Cambria Math" panose="02040503050406030204" pitchFamily="18" charset="0"/>
+                                <a:cs typeface="Times New Roman" panose="02020603050405020304" pitchFamily="18" charset="0"/>
+                              </a:rPr>
+                            </m:ctrlPr>
+                          </m:sSubPr>
+                          <m:e>
+                            <m:r>
+                              <a:rPr lang="en-US" sz="1200" i="1">
+                                <a:latin typeface="Cambria Math" panose="02040503050406030204" pitchFamily="18" charset="0"/>
+                                <a:ea typeface="Cambria Math" panose="02040503050406030204" pitchFamily="18" charset="0"/>
+                                <a:cs typeface="Times New Roman" panose="02020603050405020304" pitchFamily="18" charset="0"/>
+                              </a:rPr>
+                              <m:t>𝛿</m:t>
+                            </m:r>
+                          </m:e>
+                          <m:sub>
+                            <m:r>
+                              <a:rPr lang="en-US" sz="1200" i="1">
+                                <a:latin typeface="Cambria Math" panose="02040503050406030204" pitchFamily="18" charset="0"/>
+                                <a:ea typeface="Cambria Math" panose="02040503050406030204" pitchFamily="18" charset="0"/>
+                                <a:cs typeface="Times New Roman" panose="02020603050405020304" pitchFamily="18" charset="0"/>
+                              </a:rPr>
+                              <m:t>𝐿</m:t>
+                            </m:r>
+                            <m:r>
+                              <a:rPr lang="en-US" sz="1200" i="1">
+                                <a:latin typeface="Cambria Math" panose="02040503050406030204" pitchFamily="18" charset="0"/>
+                                <a:ea typeface="Cambria Math" panose="02040503050406030204" pitchFamily="18" charset="0"/>
+                                <a:cs typeface="Times New Roman" panose="02020603050405020304" pitchFamily="18" charset="0"/>
+                              </a:rPr>
+                              <m:t>2</m:t>
+                            </m:r>
+                          </m:sub>
+                        </m:sSub>
+                        <m:r>
+                          <a:rPr lang="en-US" sz="1200" i="1">
+                            <a:latin typeface="Cambria Math" panose="02040503050406030204" pitchFamily="18" charset="0"/>
+                            <a:ea typeface="Cambria Math" panose="02040503050406030204" pitchFamily="18" charset="0"/>
+                            <a:cs typeface="Times New Roman" panose="02020603050405020304" pitchFamily="18" charset="0"/>
+                          </a:rPr>
+                          <m:t>=</m:t>
+                        </m:r>
+                      </m:oMath>
+                    </a14:m>
+                    <a:r>
+                      <a:rPr lang="en-US" sz="1200" dirty="0">
+                        <a:latin typeface="Times New Roman" panose="02020603050405020304" pitchFamily="18" charset="0"/>
+                        <a:cs typeface="Times New Roman" panose="02020603050405020304" pitchFamily="18" charset="0"/>
+                      </a:rPr>
+                      <a:t> 0MHz</a:t>
+                    </a:r>
+                  </a:p>
+                </p:txBody>
+              </p:sp>
+            </mc:Choice>
+            <mc:Fallback xmlns="">
+              <p:sp>
+                <p:nvSpPr>
+                  <p:cNvPr id="31" name="TextBox 30">
+                    <a:extLst>
+                      <a:ext uri="{FF2B5EF4-FFF2-40B4-BE49-F238E27FC236}">
+                        <a16:creationId xmlns:a16="http://schemas.microsoft.com/office/drawing/2014/main" id="{E413DC9B-CA34-223B-D60F-7B2E7E689F3D}"/>
+                      </a:ext>
+                    </a:extLst>
+                  </p:cNvPr>
+                  <p:cNvSpPr txBox="1">
+                    <a:spLocks noRot="1" noChangeAspect="1" noMove="1" noResize="1" noEditPoints="1" noAdjustHandles="1" noChangeArrowheads="1" noChangeShapeType="1" noTextEdit="1"/>
+                  </p:cNvSpPr>
+                  <p:nvPr/>
+                </p:nvSpPr>
+                <p:spPr>
+                  <a:xfrm>
+                    <a:off x="1321057" y="2402792"/>
+                    <a:ext cx="1275536" cy="276999"/>
+                  </a:xfrm>
+                  <a:prstGeom prst="rect">
+                    <a:avLst/>
+                  </a:prstGeom>
+                  <a:blipFill>
+                    <a:blip r:embed="rId19"/>
+                    <a:stretch>
+                      <a:fillRect b="-17391"/>
+                    </a:stretch>
+                  </a:blipFill>
+                </p:spPr>
+                <p:txBody>
+                  <a:bodyPr/>
+                  <a:lstStyle/>
+                  <a:p>
+                    <a:r>
+                      <a:rPr lang="en-US">
+                        <a:noFill/>
+                      </a:rPr>
+                      <a:t> </a:t>
+                    </a:r>
+                  </a:p>
+                </p:txBody>
+              </p:sp>
+            </mc:Fallback>
+          </mc:AlternateContent>
+          <mc:AlternateContent xmlns:mc="http://schemas.openxmlformats.org/markup-compatibility/2006" xmlns:a14="http://schemas.microsoft.com/office/drawing/2010/main">
+            <mc:Choice Requires="a14">
+              <p:sp>
+                <p:nvSpPr>
+                  <p:cNvPr id="32" name="TextBox 31">
+                    <a:extLst>
+                      <a:ext uri="{FF2B5EF4-FFF2-40B4-BE49-F238E27FC236}">
+                        <a16:creationId xmlns:a16="http://schemas.microsoft.com/office/drawing/2014/main" id="{39738F29-2ABB-DC47-9898-9FD183FB1A96}"/>
+                      </a:ext>
+                    </a:extLst>
+                  </p:cNvPr>
+                  <p:cNvSpPr txBox="1"/>
+                  <p:nvPr/>
+                </p:nvSpPr>
+                <p:spPr>
+                  <a:xfrm>
+                    <a:off x="1308945" y="2599149"/>
+                    <a:ext cx="1196813" cy="276999"/>
+                  </a:xfrm>
+                  <a:prstGeom prst="rect">
+                    <a:avLst/>
+                  </a:prstGeom>
+                  <a:noFill/>
+                </p:spPr>
+                <p:txBody>
+                  <a:bodyPr wrap="square" rtlCol="0">
+                    <a:spAutoFit/>
+                  </a:bodyPr>
+                  <a:lstStyle/>
+                  <a:p>
+                    <a14:m>
+                      <m:oMath xmlns:m="http://schemas.openxmlformats.org/officeDocument/2006/math">
+                        <m:sSub>
+                          <m:sSubPr>
+                            <m:ctrlPr>
+                              <a:rPr lang="en-US" sz="1200" i="1" smtClean="0">
+                                <a:latin typeface="Cambria Math" panose="02040503050406030204" pitchFamily="18" charset="0"/>
+                                <a:ea typeface="Cambria Math" panose="02040503050406030204" pitchFamily="18" charset="0"/>
+                                <a:cs typeface="Times New Roman" panose="02020603050405020304" pitchFamily="18" charset="0"/>
+                              </a:rPr>
+                            </m:ctrlPr>
+                          </m:sSubPr>
+                          <m:e>
+                            <m:r>
+                              <a:rPr lang="en-US" sz="1200" i="1" smtClean="0">
+                                <a:latin typeface="Cambria Math" panose="02040503050406030204" pitchFamily="18" charset="0"/>
+                                <a:ea typeface="Cambria Math" panose="02040503050406030204" pitchFamily="18" charset="0"/>
+                                <a:cs typeface="Times New Roman" panose="02020603050405020304" pitchFamily="18" charset="0"/>
+                              </a:rPr>
+                              <m:t>ℰ</m:t>
+                            </m:r>
+                          </m:e>
+                          <m:sub>
+                            <m:r>
+                              <a:rPr lang="en-US" sz="1200" b="0" i="1" smtClean="0">
+                                <a:latin typeface="Cambria Math" panose="02040503050406030204" pitchFamily="18" charset="0"/>
+                                <a:ea typeface="Cambria Math" panose="02040503050406030204" pitchFamily="18" charset="0"/>
+                                <a:cs typeface="Times New Roman" panose="02020603050405020304" pitchFamily="18" charset="0"/>
+                              </a:rPr>
+                              <m:t>𝑛𝑟</m:t>
+                            </m:r>
+                          </m:sub>
+                        </m:sSub>
+                        <m:r>
+                          <a:rPr lang="en-US" sz="1200" i="1">
+                            <a:latin typeface="Cambria Math" panose="02040503050406030204" pitchFamily="18" charset="0"/>
+                            <a:ea typeface="Cambria Math" panose="02040503050406030204" pitchFamily="18" charset="0"/>
+                            <a:cs typeface="Times New Roman" panose="02020603050405020304" pitchFamily="18" charset="0"/>
+                          </a:rPr>
+                          <m:t>=</m:t>
+                        </m:r>
+                      </m:oMath>
+                    </a14:m>
+                    <a:r>
+                      <a:rPr lang="en-US" sz="1200" dirty="0">
+                        <a:latin typeface="Times New Roman" panose="02020603050405020304" pitchFamily="18" charset="0"/>
+                        <a:cs typeface="Times New Roman" panose="02020603050405020304" pitchFamily="18" charset="0"/>
+                      </a:rPr>
+                      <a:t> 3V/m</a:t>
+                    </a:r>
+                  </a:p>
+                </p:txBody>
+              </p:sp>
+            </mc:Choice>
+            <mc:Fallback xmlns="">
+              <p:sp>
+                <p:nvSpPr>
+                  <p:cNvPr id="32" name="TextBox 31">
+                    <a:extLst>
+                      <a:ext uri="{FF2B5EF4-FFF2-40B4-BE49-F238E27FC236}">
+                        <a16:creationId xmlns:a16="http://schemas.microsoft.com/office/drawing/2014/main" id="{39738F29-2ABB-DC47-9898-9FD183FB1A96}"/>
+                      </a:ext>
+                    </a:extLst>
+                  </p:cNvPr>
+                  <p:cNvSpPr txBox="1">
+                    <a:spLocks noRot="1" noChangeAspect="1" noMove="1" noResize="1" noEditPoints="1" noAdjustHandles="1" noChangeArrowheads="1" noChangeShapeType="1" noTextEdit="1"/>
+                  </p:cNvSpPr>
+                  <p:nvPr/>
+                </p:nvSpPr>
+                <p:spPr>
+                  <a:xfrm>
+                    <a:off x="1308945" y="2599149"/>
+                    <a:ext cx="1196813" cy="276999"/>
+                  </a:xfrm>
+                  <a:prstGeom prst="rect">
+                    <a:avLst/>
+                  </a:prstGeom>
+                  <a:blipFill>
+                    <a:blip r:embed="rId20"/>
+                    <a:stretch>
+                      <a:fillRect b="-13043"/>
+                    </a:stretch>
+                  </a:blipFill>
+                </p:spPr>
+                <p:txBody>
+                  <a:bodyPr/>
+                  <a:lstStyle/>
+                  <a:p>
+                    <a:r>
+                      <a:rPr lang="en-US">
+                        <a:noFill/>
+                      </a:rPr>
+                      <a:t> </a:t>
+                    </a:r>
+                  </a:p>
+                </p:txBody>
+              </p:sp>
+            </mc:Fallback>
+          </mc:AlternateContent>
+        </p:grpSp>
+        <p:grpSp>
+          <p:nvGrpSpPr>
+            <p:cNvPr id="37" name="Group 36">
+              <a:extLst>
+                <a:ext uri="{FF2B5EF4-FFF2-40B4-BE49-F238E27FC236}">
+                  <a16:creationId xmlns:a16="http://schemas.microsoft.com/office/drawing/2014/main" id="{98F68468-E329-6F84-2140-A7C354D4CE91}"/>
+                </a:ext>
+              </a:extLst>
+            </p:cNvPr>
+            <p:cNvGrpSpPr/>
+            <p:nvPr/>
+          </p:nvGrpSpPr>
+          <p:grpSpPr>
+            <a:xfrm>
+              <a:off x="1940584" y="5230768"/>
+              <a:ext cx="1594024" cy="473356"/>
+              <a:chOff x="1308945" y="2402792"/>
+              <a:chExt cx="1594024" cy="473356"/>
+            </a:xfrm>
+          </p:grpSpPr>
+          <mc:AlternateContent xmlns:mc="http://schemas.openxmlformats.org/markup-compatibility/2006" xmlns:a14="http://schemas.microsoft.com/office/drawing/2010/main">
+            <mc:Choice Requires="a14">
+              <p:sp>
+                <p:nvSpPr>
+                  <p:cNvPr id="38" name="TextBox 37">
+                    <a:extLst>
+                      <a:ext uri="{FF2B5EF4-FFF2-40B4-BE49-F238E27FC236}">
+                        <a16:creationId xmlns:a16="http://schemas.microsoft.com/office/drawing/2014/main" id="{5BDBDF71-5077-525C-D266-410E30E90E61}"/>
+                      </a:ext>
+                    </a:extLst>
+                  </p:cNvPr>
+                  <p:cNvSpPr txBox="1"/>
+                  <p:nvPr/>
+                </p:nvSpPr>
+                <p:spPr>
+                  <a:xfrm>
+                    <a:off x="1321056" y="2402792"/>
+                    <a:ext cx="1581913" cy="276999"/>
+                  </a:xfrm>
+                  <a:prstGeom prst="rect">
+                    <a:avLst/>
+                  </a:prstGeom>
+                  <a:noFill/>
+                </p:spPr>
+                <p:txBody>
+                  <a:bodyPr wrap="square" rtlCol="0">
+                    <a:spAutoFit/>
+                  </a:bodyPr>
+                  <a:lstStyle/>
+                  <a:p>
+                    <a14:m>
+                      <m:oMath xmlns:m="http://schemas.openxmlformats.org/officeDocument/2006/math">
+                        <m:sSub>
+                          <m:sSubPr>
+                            <m:ctrlPr>
+                              <a:rPr lang="en-US" sz="1200" i="1" smtClean="0">
+                                <a:latin typeface="Cambria Math" panose="02040503050406030204" pitchFamily="18" charset="0"/>
+                                <a:ea typeface="Cambria Math" panose="02040503050406030204" pitchFamily="18" charset="0"/>
+                                <a:cs typeface="Times New Roman" panose="02020603050405020304" pitchFamily="18" charset="0"/>
+                              </a:rPr>
+                            </m:ctrlPr>
+                          </m:sSubPr>
+                          <m:e>
+                            <m:r>
+                              <a:rPr lang="en-US" sz="1200" i="1">
+                                <a:latin typeface="Cambria Math" panose="02040503050406030204" pitchFamily="18" charset="0"/>
+                                <a:ea typeface="Cambria Math" panose="02040503050406030204" pitchFamily="18" charset="0"/>
+                                <a:cs typeface="Times New Roman" panose="02020603050405020304" pitchFamily="18" charset="0"/>
+                              </a:rPr>
+                              <m:t>𝛿</m:t>
+                            </m:r>
+                          </m:e>
+                          <m:sub>
+                            <m:r>
+                              <a:rPr lang="en-US" sz="1200" i="1">
+                                <a:latin typeface="Cambria Math" panose="02040503050406030204" pitchFamily="18" charset="0"/>
+                                <a:ea typeface="Cambria Math" panose="02040503050406030204" pitchFamily="18" charset="0"/>
+                                <a:cs typeface="Times New Roman" panose="02020603050405020304" pitchFamily="18" charset="0"/>
+                              </a:rPr>
+                              <m:t>𝐿</m:t>
+                            </m:r>
+                            <m:r>
+                              <a:rPr lang="en-US" sz="1200" i="1">
+                                <a:latin typeface="Cambria Math" panose="02040503050406030204" pitchFamily="18" charset="0"/>
+                                <a:ea typeface="Cambria Math" panose="02040503050406030204" pitchFamily="18" charset="0"/>
+                                <a:cs typeface="Times New Roman" panose="02020603050405020304" pitchFamily="18" charset="0"/>
+                              </a:rPr>
+                              <m:t>2</m:t>
+                            </m:r>
+                          </m:sub>
+                        </m:sSub>
+                        <m:r>
+                          <a:rPr lang="en-US" sz="1200" i="1">
+                            <a:latin typeface="Cambria Math" panose="02040503050406030204" pitchFamily="18" charset="0"/>
+                            <a:ea typeface="Cambria Math" panose="02040503050406030204" pitchFamily="18" charset="0"/>
+                            <a:cs typeface="Times New Roman" panose="02020603050405020304" pitchFamily="18" charset="0"/>
+                          </a:rPr>
+                          <m:t>=</m:t>
+                        </m:r>
+                        <m:r>
+                          <a:rPr lang="en-US" sz="1200" b="0" i="1" smtClean="0">
+                            <a:latin typeface="Cambria Math" panose="02040503050406030204" pitchFamily="18" charset="0"/>
+                            <a:ea typeface="Cambria Math" panose="02040503050406030204" pitchFamily="18" charset="0"/>
+                            <a:cs typeface="Times New Roman" panose="02020603050405020304" pitchFamily="18" charset="0"/>
+                          </a:rPr>
+                          <m:t> </m:t>
+                        </m:r>
+                      </m:oMath>
+                    </a14:m>
+                    <a:r>
+                      <a:rPr lang="en-US" sz="1200" dirty="0">
+                        <a:latin typeface="Times New Roman" panose="02020603050405020304" pitchFamily="18" charset="0"/>
+                        <a:cs typeface="Times New Roman" panose="02020603050405020304" pitchFamily="18" charset="0"/>
+                      </a:rPr>
+                      <a:t>3</a:t>
+                    </a:r>
+                    <a14:m>
+                      <m:oMath xmlns:m="http://schemas.openxmlformats.org/officeDocument/2006/math">
+                        <m:r>
+                          <a:rPr lang="en-US" sz="1200" i="1" smtClean="0">
+                            <a:latin typeface="Cambria Math" panose="02040503050406030204" pitchFamily="18" charset="0"/>
+                            <a:ea typeface="Cambria Math" panose="02040503050406030204" pitchFamily="18" charset="0"/>
+                            <a:cs typeface="Times New Roman" panose="02020603050405020304" pitchFamily="18" charset="0"/>
+                          </a:rPr>
+                          <m:t>×</m:t>
+                        </m:r>
+                      </m:oMath>
+                    </a14:m>
+                    <a:r>
+                      <a:rPr lang="en-US" sz="1200" dirty="0">
+                        <a:latin typeface="Times New Roman" panose="02020603050405020304" pitchFamily="18" charset="0"/>
+                        <a:cs typeface="Times New Roman" panose="02020603050405020304" pitchFamily="18" charset="0"/>
+                      </a:rPr>
+                      <a:t>2</a:t>
+                    </a:r>
+                    <a14:m>
+                      <m:oMath xmlns:m="http://schemas.openxmlformats.org/officeDocument/2006/math">
+                        <m:r>
+                          <a:rPr lang="en-US" sz="1200" i="1" smtClean="0">
+                            <a:latin typeface="Cambria Math" panose="02040503050406030204" pitchFamily="18" charset="0"/>
+                            <a:ea typeface="Cambria Math" panose="02040503050406030204" pitchFamily="18" charset="0"/>
+                            <a:cs typeface="Times New Roman" panose="02020603050405020304" pitchFamily="18" charset="0"/>
+                          </a:rPr>
+                          <m:t>𝜋</m:t>
+                        </m:r>
+                        <m:r>
+                          <a:rPr lang="en-US" sz="1200" i="1">
+                            <a:latin typeface="Cambria Math" panose="02040503050406030204" pitchFamily="18" charset="0"/>
+                            <a:ea typeface="Cambria Math" panose="02040503050406030204" pitchFamily="18" charset="0"/>
+                            <a:cs typeface="Times New Roman" panose="02020603050405020304" pitchFamily="18" charset="0"/>
+                          </a:rPr>
+                          <m:t> </m:t>
+                        </m:r>
+                      </m:oMath>
+                    </a14:m>
+                    <a:r>
+                      <a:rPr lang="en-US" sz="1200" dirty="0">
+                        <a:latin typeface="Times New Roman" panose="02020603050405020304" pitchFamily="18" charset="0"/>
+                        <a:cs typeface="Times New Roman" panose="02020603050405020304" pitchFamily="18" charset="0"/>
+                      </a:rPr>
+                      <a:t>MHz</a:t>
+                    </a:r>
+                  </a:p>
+                </p:txBody>
+              </p:sp>
+            </mc:Choice>
+            <mc:Fallback xmlns="">
+              <p:sp>
+                <p:nvSpPr>
+                  <p:cNvPr id="38" name="TextBox 37">
+                    <a:extLst>
+                      <a:ext uri="{FF2B5EF4-FFF2-40B4-BE49-F238E27FC236}">
+                        <a16:creationId xmlns:a16="http://schemas.microsoft.com/office/drawing/2014/main" id="{5BDBDF71-5077-525C-D266-410E30E90E61}"/>
+                      </a:ext>
+                    </a:extLst>
+                  </p:cNvPr>
+                  <p:cNvSpPr txBox="1">
+                    <a:spLocks noRot="1" noChangeAspect="1" noMove="1" noResize="1" noEditPoints="1" noAdjustHandles="1" noChangeArrowheads="1" noChangeShapeType="1" noTextEdit="1"/>
+                  </p:cNvSpPr>
+                  <p:nvPr/>
+                </p:nvSpPr>
+                <p:spPr>
+                  <a:xfrm>
+                    <a:off x="1321056" y="2402792"/>
+                    <a:ext cx="1581913" cy="276999"/>
+                  </a:xfrm>
+                  <a:prstGeom prst="rect">
+                    <a:avLst/>
+                  </a:prstGeom>
+                  <a:blipFill>
+                    <a:blip r:embed="rId21"/>
+                    <a:stretch>
+                      <a:fillRect b="-17391"/>
+                    </a:stretch>
+                  </a:blipFill>
+                </p:spPr>
+                <p:txBody>
+                  <a:bodyPr/>
+                  <a:lstStyle/>
+                  <a:p>
+                    <a:r>
+                      <a:rPr lang="en-US">
+                        <a:noFill/>
+                      </a:rPr>
+                      <a:t> </a:t>
+                    </a:r>
+                  </a:p>
+                </p:txBody>
+              </p:sp>
+            </mc:Fallback>
+          </mc:AlternateContent>
+          <mc:AlternateContent xmlns:mc="http://schemas.openxmlformats.org/markup-compatibility/2006" xmlns:a14="http://schemas.microsoft.com/office/drawing/2010/main">
+            <mc:Choice Requires="a14">
+              <p:sp>
+                <p:nvSpPr>
+                  <p:cNvPr id="39" name="TextBox 38">
+                    <a:extLst>
+                      <a:ext uri="{FF2B5EF4-FFF2-40B4-BE49-F238E27FC236}">
+                        <a16:creationId xmlns:a16="http://schemas.microsoft.com/office/drawing/2014/main" id="{CCD2DC99-E531-B743-D124-72E11889A398}"/>
+                      </a:ext>
+                    </a:extLst>
+                  </p:cNvPr>
+                  <p:cNvSpPr txBox="1"/>
+                  <p:nvPr/>
+                </p:nvSpPr>
+                <p:spPr>
+                  <a:xfrm>
+                    <a:off x="1308945" y="2599149"/>
+                    <a:ext cx="1196813" cy="276999"/>
+                  </a:xfrm>
+                  <a:prstGeom prst="rect">
+                    <a:avLst/>
+                  </a:prstGeom>
+                  <a:noFill/>
+                </p:spPr>
+                <p:txBody>
+                  <a:bodyPr wrap="square" rtlCol="0">
+                    <a:spAutoFit/>
+                  </a:bodyPr>
+                  <a:lstStyle/>
+                  <a:p>
+                    <a14:m>
+                      <m:oMath xmlns:m="http://schemas.openxmlformats.org/officeDocument/2006/math">
+                        <m:sSub>
+                          <m:sSubPr>
+                            <m:ctrlPr>
+                              <a:rPr lang="en-US" sz="1200" i="1" smtClean="0">
+                                <a:latin typeface="Cambria Math" panose="02040503050406030204" pitchFamily="18" charset="0"/>
+                                <a:ea typeface="Cambria Math" panose="02040503050406030204" pitchFamily="18" charset="0"/>
+                                <a:cs typeface="Times New Roman" panose="02020603050405020304" pitchFamily="18" charset="0"/>
+                              </a:rPr>
+                            </m:ctrlPr>
+                          </m:sSubPr>
+                          <m:e>
+                            <m:r>
+                              <a:rPr lang="en-US" sz="1200" i="1" smtClean="0">
+                                <a:latin typeface="Cambria Math" panose="02040503050406030204" pitchFamily="18" charset="0"/>
+                                <a:ea typeface="Cambria Math" panose="02040503050406030204" pitchFamily="18" charset="0"/>
+                                <a:cs typeface="Times New Roman" panose="02020603050405020304" pitchFamily="18" charset="0"/>
+                              </a:rPr>
+                              <m:t>ℰ</m:t>
+                            </m:r>
+                          </m:e>
+                          <m:sub>
+                            <m:r>
+                              <a:rPr lang="en-US" sz="1200" b="0" i="1" smtClean="0">
+                                <a:latin typeface="Cambria Math" panose="02040503050406030204" pitchFamily="18" charset="0"/>
+                                <a:ea typeface="Cambria Math" panose="02040503050406030204" pitchFamily="18" charset="0"/>
+                                <a:cs typeface="Times New Roman" panose="02020603050405020304" pitchFamily="18" charset="0"/>
+                              </a:rPr>
+                              <m:t>𝑛𝑟</m:t>
+                            </m:r>
+                          </m:sub>
+                        </m:sSub>
+                        <m:r>
+                          <a:rPr lang="en-US" sz="1200" i="1">
+                            <a:latin typeface="Cambria Math" panose="02040503050406030204" pitchFamily="18" charset="0"/>
+                            <a:ea typeface="Cambria Math" panose="02040503050406030204" pitchFamily="18" charset="0"/>
+                            <a:cs typeface="Times New Roman" panose="02020603050405020304" pitchFamily="18" charset="0"/>
+                          </a:rPr>
+                          <m:t>=</m:t>
+                        </m:r>
+                      </m:oMath>
+                    </a14:m>
+                    <a:r>
+                      <a:rPr lang="en-US" sz="1200" dirty="0">
+                        <a:latin typeface="Times New Roman" panose="02020603050405020304" pitchFamily="18" charset="0"/>
+                        <a:cs typeface="Times New Roman" panose="02020603050405020304" pitchFamily="18" charset="0"/>
+                      </a:rPr>
+                      <a:t> 3V/m</a:t>
+                    </a:r>
+                  </a:p>
+                </p:txBody>
+              </p:sp>
+            </mc:Choice>
+            <mc:Fallback xmlns="">
+              <p:sp>
+                <p:nvSpPr>
+                  <p:cNvPr id="39" name="TextBox 38">
+                    <a:extLst>
+                      <a:ext uri="{FF2B5EF4-FFF2-40B4-BE49-F238E27FC236}">
+                        <a16:creationId xmlns:a16="http://schemas.microsoft.com/office/drawing/2014/main" id="{CCD2DC99-E531-B743-D124-72E11889A398}"/>
+                      </a:ext>
+                    </a:extLst>
+                  </p:cNvPr>
+                  <p:cNvSpPr txBox="1">
+                    <a:spLocks noRot="1" noChangeAspect="1" noMove="1" noResize="1" noEditPoints="1" noAdjustHandles="1" noChangeArrowheads="1" noChangeShapeType="1" noTextEdit="1"/>
+                  </p:cNvSpPr>
+                  <p:nvPr/>
+                </p:nvSpPr>
+                <p:spPr>
+                  <a:xfrm>
+                    <a:off x="1308945" y="2599149"/>
+                    <a:ext cx="1196813" cy="276999"/>
+                  </a:xfrm>
+                  <a:prstGeom prst="rect">
+                    <a:avLst/>
+                  </a:prstGeom>
+                  <a:blipFill>
+                    <a:blip r:embed="rId22"/>
+                    <a:stretch>
+                      <a:fillRect b="-17391"/>
+                    </a:stretch>
+                  </a:blipFill>
+                </p:spPr>
+                <p:txBody>
+                  <a:bodyPr/>
+                  <a:lstStyle/>
+                  <a:p>
+                    <a:r>
+                      <a:rPr lang="en-US">
+                        <a:noFill/>
+                      </a:rPr>
+                      <a:t> </a:t>
+                    </a:r>
+                  </a:p>
+                </p:txBody>
+              </p:sp>
+            </mc:Fallback>
+          </mc:AlternateContent>
+        </p:grpSp>
+        <p:grpSp>
+          <p:nvGrpSpPr>
+            <p:cNvPr id="40" name="Group 39">
+              <a:extLst>
+                <a:ext uri="{FF2B5EF4-FFF2-40B4-BE49-F238E27FC236}">
+                  <a16:creationId xmlns:a16="http://schemas.microsoft.com/office/drawing/2014/main" id="{5733978B-4B0E-B13E-A4A1-316E9BDD50C5}"/>
+                </a:ext>
+              </a:extLst>
+            </p:cNvPr>
+            <p:cNvGrpSpPr/>
+            <p:nvPr/>
+          </p:nvGrpSpPr>
+          <p:grpSpPr>
+            <a:xfrm>
+              <a:off x="5006419" y="5230768"/>
+              <a:ext cx="1443268" cy="473356"/>
+              <a:chOff x="1308945" y="2402792"/>
+              <a:chExt cx="1443268" cy="473356"/>
+            </a:xfrm>
+          </p:grpSpPr>
+          <mc:AlternateContent xmlns:mc="http://schemas.openxmlformats.org/markup-compatibility/2006" xmlns:a14="http://schemas.microsoft.com/office/drawing/2010/main">
+            <mc:Choice Requires="a14">
+              <p:sp>
+                <p:nvSpPr>
+                  <p:cNvPr id="41" name="TextBox 40">
+                    <a:extLst>
+                      <a:ext uri="{FF2B5EF4-FFF2-40B4-BE49-F238E27FC236}">
+                        <a16:creationId xmlns:a16="http://schemas.microsoft.com/office/drawing/2014/main" id="{F437CD10-10D3-FCD6-EE23-CCD6EBBC0279}"/>
+                      </a:ext>
+                    </a:extLst>
+                  </p:cNvPr>
+                  <p:cNvSpPr txBox="1"/>
+                  <p:nvPr/>
+                </p:nvSpPr>
+                <p:spPr>
+                  <a:xfrm>
+                    <a:off x="1321056" y="2402792"/>
+                    <a:ext cx="1431157" cy="276999"/>
+                  </a:xfrm>
+                  <a:prstGeom prst="rect">
+                    <a:avLst/>
+                  </a:prstGeom>
+                  <a:noFill/>
+                </p:spPr>
+                <p:txBody>
+                  <a:bodyPr wrap="square" rtlCol="0">
+                    <a:spAutoFit/>
+                  </a:bodyPr>
+                  <a:lstStyle/>
+                  <a:p>
+                    <a14:m>
+                      <m:oMath xmlns:m="http://schemas.openxmlformats.org/officeDocument/2006/math">
+                        <m:sSub>
+                          <m:sSubPr>
+                            <m:ctrlPr>
+                              <a:rPr lang="en-US" sz="1200" i="1" smtClean="0">
+                                <a:latin typeface="Cambria Math" panose="02040503050406030204" pitchFamily="18" charset="0"/>
+                                <a:ea typeface="Cambria Math" panose="02040503050406030204" pitchFamily="18" charset="0"/>
+                                <a:cs typeface="Times New Roman" panose="02020603050405020304" pitchFamily="18" charset="0"/>
+                              </a:rPr>
+                            </m:ctrlPr>
+                          </m:sSubPr>
+                          <m:e>
+                            <m:r>
+                              <a:rPr lang="en-US" sz="1200" i="1">
+                                <a:latin typeface="Cambria Math" panose="02040503050406030204" pitchFamily="18" charset="0"/>
+                                <a:ea typeface="Cambria Math" panose="02040503050406030204" pitchFamily="18" charset="0"/>
+                                <a:cs typeface="Times New Roman" panose="02020603050405020304" pitchFamily="18" charset="0"/>
+                              </a:rPr>
+                              <m:t>𝛿</m:t>
+                            </m:r>
+                          </m:e>
+                          <m:sub>
+                            <m:r>
+                              <a:rPr lang="en-US" sz="1200" i="1">
+                                <a:latin typeface="Cambria Math" panose="02040503050406030204" pitchFamily="18" charset="0"/>
+                                <a:ea typeface="Cambria Math" panose="02040503050406030204" pitchFamily="18" charset="0"/>
+                                <a:cs typeface="Times New Roman" panose="02020603050405020304" pitchFamily="18" charset="0"/>
+                              </a:rPr>
+                              <m:t>𝐿</m:t>
+                            </m:r>
+                            <m:r>
+                              <a:rPr lang="en-US" sz="1200" i="1">
+                                <a:latin typeface="Cambria Math" panose="02040503050406030204" pitchFamily="18" charset="0"/>
+                                <a:ea typeface="Cambria Math" panose="02040503050406030204" pitchFamily="18" charset="0"/>
+                                <a:cs typeface="Times New Roman" panose="02020603050405020304" pitchFamily="18" charset="0"/>
+                              </a:rPr>
+                              <m:t>2</m:t>
+                            </m:r>
+                          </m:sub>
+                        </m:sSub>
+                        <m:r>
+                          <a:rPr lang="en-US" sz="1200" i="1">
+                            <a:latin typeface="Cambria Math" panose="02040503050406030204" pitchFamily="18" charset="0"/>
+                            <a:ea typeface="Cambria Math" panose="02040503050406030204" pitchFamily="18" charset="0"/>
+                            <a:cs typeface="Times New Roman" panose="02020603050405020304" pitchFamily="18" charset="0"/>
+                          </a:rPr>
+                          <m:t>=</m:t>
+                        </m:r>
+                        <m:r>
+                          <a:rPr lang="en-US" sz="1200" b="0" i="1" smtClean="0">
+                            <a:latin typeface="Cambria Math" panose="02040503050406030204" pitchFamily="18" charset="0"/>
+                            <a:ea typeface="Cambria Math" panose="02040503050406030204" pitchFamily="18" charset="0"/>
+                            <a:cs typeface="Times New Roman" panose="02020603050405020304" pitchFamily="18" charset="0"/>
+                          </a:rPr>
+                          <m:t> </m:t>
+                        </m:r>
+                      </m:oMath>
+                    </a14:m>
+                    <a:r>
+                      <a:rPr lang="en-US" sz="1200" dirty="0">
+                        <a:latin typeface="Times New Roman" panose="02020603050405020304" pitchFamily="18" charset="0"/>
+                        <a:cs typeface="Times New Roman" panose="02020603050405020304" pitchFamily="18" charset="0"/>
+                      </a:rPr>
+                      <a:t>1</a:t>
+                    </a:r>
+                    <a14:m>
+                      <m:oMath xmlns:m="http://schemas.openxmlformats.org/officeDocument/2006/math">
+                        <m:r>
+                          <a:rPr lang="en-US" sz="1200" i="1" smtClean="0">
+                            <a:latin typeface="Cambria Math" panose="02040503050406030204" pitchFamily="18" charset="0"/>
+                            <a:ea typeface="Cambria Math" panose="02040503050406030204" pitchFamily="18" charset="0"/>
+                            <a:cs typeface="Times New Roman" panose="02020603050405020304" pitchFamily="18" charset="0"/>
+                          </a:rPr>
+                          <m:t>×</m:t>
+                        </m:r>
+                      </m:oMath>
+                    </a14:m>
+                    <a:r>
+                      <a:rPr lang="en-US" sz="1200" dirty="0">
+                        <a:latin typeface="Times New Roman" panose="02020603050405020304" pitchFamily="18" charset="0"/>
+                        <a:cs typeface="Times New Roman" panose="02020603050405020304" pitchFamily="18" charset="0"/>
+                      </a:rPr>
+                      <a:t>2</a:t>
+                    </a:r>
+                    <a14:m>
+                      <m:oMath xmlns:m="http://schemas.openxmlformats.org/officeDocument/2006/math">
+                        <m:r>
+                          <a:rPr lang="en-US" sz="1200" i="1" smtClean="0">
+                            <a:latin typeface="Cambria Math" panose="02040503050406030204" pitchFamily="18" charset="0"/>
+                            <a:ea typeface="Cambria Math" panose="02040503050406030204" pitchFamily="18" charset="0"/>
+                            <a:cs typeface="Times New Roman" panose="02020603050405020304" pitchFamily="18" charset="0"/>
+                          </a:rPr>
+                          <m:t>𝜋</m:t>
+                        </m:r>
+                        <m:r>
+                          <a:rPr lang="en-US" sz="1200" i="1">
+                            <a:latin typeface="Cambria Math" panose="02040503050406030204" pitchFamily="18" charset="0"/>
+                            <a:ea typeface="Cambria Math" panose="02040503050406030204" pitchFamily="18" charset="0"/>
+                            <a:cs typeface="Times New Roman" panose="02020603050405020304" pitchFamily="18" charset="0"/>
+                          </a:rPr>
+                          <m:t> </m:t>
+                        </m:r>
+                      </m:oMath>
+                    </a14:m>
+                    <a:r>
+                      <a:rPr lang="en-US" sz="1200" dirty="0">
+                        <a:latin typeface="Times New Roman" panose="02020603050405020304" pitchFamily="18" charset="0"/>
+                        <a:cs typeface="Times New Roman" panose="02020603050405020304" pitchFamily="18" charset="0"/>
+                      </a:rPr>
+                      <a:t>MHz</a:t>
+                    </a:r>
+                  </a:p>
+                </p:txBody>
+              </p:sp>
+            </mc:Choice>
+            <mc:Fallback xmlns="">
+              <p:sp>
+                <p:nvSpPr>
+                  <p:cNvPr id="41" name="TextBox 40">
+                    <a:extLst>
+                      <a:ext uri="{FF2B5EF4-FFF2-40B4-BE49-F238E27FC236}">
+                        <a16:creationId xmlns:a16="http://schemas.microsoft.com/office/drawing/2014/main" id="{F437CD10-10D3-FCD6-EE23-CCD6EBBC0279}"/>
+                      </a:ext>
+                    </a:extLst>
+                  </p:cNvPr>
+                  <p:cNvSpPr txBox="1">
+                    <a:spLocks noRot="1" noChangeAspect="1" noMove="1" noResize="1" noEditPoints="1" noAdjustHandles="1" noChangeArrowheads="1" noChangeShapeType="1" noTextEdit="1"/>
+                  </p:cNvSpPr>
+                  <p:nvPr/>
+                </p:nvSpPr>
+                <p:spPr>
+                  <a:xfrm>
+                    <a:off x="1321056" y="2402792"/>
+                    <a:ext cx="1431157" cy="276999"/>
+                  </a:xfrm>
+                  <a:prstGeom prst="rect">
+                    <a:avLst/>
+                  </a:prstGeom>
+                  <a:blipFill>
+                    <a:blip r:embed="rId23"/>
+                    <a:stretch>
+                      <a:fillRect b="-17391"/>
+                    </a:stretch>
+                  </a:blipFill>
+                </p:spPr>
+                <p:txBody>
+                  <a:bodyPr/>
+                  <a:lstStyle/>
+                  <a:p>
+                    <a:r>
+                      <a:rPr lang="en-US">
+                        <a:noFill/>
+                      </a:rPr>
+                      <a:t> </a:t>
+                    </a:r>
+                  </a:p>
+                </p:txBody>
+              </p:sp>
+            </mc:Fallback>
+          </mc:AlternateContent>
+          <mc:AlternateContent xmlns:mc="http://schemas.openxmlformats.org/markup-compatibility/2006" xmlns:a14="http://schemas.microsoft.com/office/drawing/2010/main">
+            <mc:Choice Requires="a14">
+              <p:sp>
+                <p:nvSpPr>
+                  <p:cNvPr id="42" name="TextBox 41">
+                    <a:extLst>
+                      <a:ext uri="{FF2B5EF4-FFF2-40B4-BE49-F238E27FC236}">
+                        <a16:creationId xmlns:a16="http://schemas.microsoft.com/office/drawing/2014/main" id="{2A202A13-353F-353A-FA9C-9FEF7880E56E}"/>
+                      </a:ext>
+                    </a:extLst>
+                  </p:cNvPr>
+                  <p:cNvSpPr txBox="1"/>
+                  <p:nvPr/>
+                </p:nvSpPr>
+                <p:spPr>
+                  <a:xfrm>
+                    <a:off x="1308945" y="2599149"/>
+                    <a:ext cx="1196813" cy="276999"/>
+                  </a:xfrm>
+                  <a:prstGeom prst="rect">
+                    <a:avLst/>
+                  </a:prstGeom>
+                  <a:noFill/>
+                </p:spPr>
+                <p:txBody>
+                  <a:bodyPr wrap="square" rtlCol="0">
+                    <a:spAutoFit/>
+                  </a:bodyPr>
+                  <a:lstStyle/>
+                  <a:p>
+                    <a14:m>
+                      <m:oMath xmlns:m="http://schemas.openxmlformats.org/officeDocument/2006/math">
+                        <m:sSub>
+                          <m:sSubPr>
+                            <m:ctrlPr>
+                              <a:rPr lang="en-US" sz="1200" i="1" smtClean="0">
+                                <a:latin typeface="Cambria Math" panose="02040503050406030204" pitchFamily="18" charset="0"/>
+                                <a:ea typeface="Cambria Math" panose="02040503050406030204" pitchFamily="18" charset="0"/>
+                                <a:cs typeface="Times New Roman" panose="02020603050405020304" pitchFamily="18" charset="0"/>
+                              </a:rPr>
+                            </m:ctrlPr>
+                          </m:sSubPr>
+                          <m:e>
+                            <m:r>
+                              <a:rPr lang="en-US" sz="1200" i="1" smtClean="0">
+                                <a:latin typeface="Cambria Math" panose="02040503050406030204" pitchFamily="18" charset="0"/>
+                                <a:ea typeface="Cambria Math" panose="02040503050406030204" pitchFamily="18" charset="0"/>
+                                <a:cs typeface="Times New Roman" panose="02020603050405020304" pitchFamily="18" charset="0"/>
+                              </a:rPr>
+                              <m:t>ℰ</m:t>
+                            </m:r>
+                          </m:e>
+                          <m:sub>
+                            <m:r>
+                              <a:rPr lang="en-US" sz="1200" b="0" i="1" smtClean="0">
+                                <a:latin typeface="Cambria Math" panose="02040503050406030204" pitchFamily="18" charset="0"/>
+                                <a:ea typeface="Cambria Math" panose="02040503050406030204" pitchFamily="18" charset="0"/>
+                                <a:cs typeface="Times New Roman" panose="02020603050405020304" pitchFamily="18" charset="0"/>
+                              </a:rPr>
+                              <m:t>𝑛𝑟</m:t>
+                            </m:r>
+                          </m:sub>
+                        </m:sSub>
+                        <m:r>
+                          <a:rPr lang="en-US" sz="1200" i="1">
+                            <a:latin typeface="Cambria Math" panose="02040503050406030204" pitchFamily="18" charset="0"/>
+                            <a:ea typeface="Cambria Math" panose="02040503050406030204" pitchFamily="18" charset="0"/>
+                            <a:cs typeface="Times New Roman" panose="02020603050405020304" pitchFamily="18" charset="0"/>
+                          </a:rPr>
+                          <m:t>=</m:t>
+                        </m:r>
+                      </m:oMath>
+                    </a14:m>
+                    <a:r>
+                      <a:rPr lang="en-US" sz="1200" dirty="0">
+                        <a:latin typeface="Times New Roman" panose="02020603050405020304" pitchFamily="18" charset="0"/>
+                        <a:cs typeface="Times New Roman" panose="02020603050405020304" pitchFamily="18" charset="0"/>
+                      </a:rPr>
+                      <a:t> 3V/m</a:t>
+                    </a:r>
+                  </a:p>
+                </p:txBody>
+              </p:sp>
+            </mc:Choice>
+            <mc:Fallback xmlns="">
+              <p:sp>
+                <p:nvSpPr>
+                  <p:cNvPr id="42" name="TextBox 41">
+                    <a:extLst>
+                      <a:ext uri="{FF2B5EF4-FFF2-40B4-BE49-F238E27FC236}">
+                        <a16:creationId xmlns:a16="http://schemas.microsoft.com/office/drawing/2014/main" id="{2A202A13-353F-353A-FA9C-9FEF7880E56E}"/>
+                      </a:ext>
+                    </a:extLst>
+                  </p:cNvPr>
+                  <p:cNvSpPr txBox="1">
+                    <a:spLocks noRot="1" noChangeAspect="1" noMove="1" noResize="1" noEditPoints="1" noAdjustHandles="1" noChangeArrowheads="1" noChangeShapeType="1" noTextEdit="1"/>
+                  </p:cNvSpPr>
+                  <p:nvPr/>
+                </p:nvSpPr>
+                <p:spPr>
+                  <a:xfrm>
+                    <a:off x="1308945" y="2599149"/>
+                    <a:ext cx="1196813" cy="276999"/>
+                  </a:xfrm>
+                  <a:prstGeom prst="rect">
+                    <a:avLst/>
+                  </a:prstGeom>
+                  <a:blipFill>
+                    <a:blip r:embed="rId24"/>
+                    <a:stretch>
+                      <a:fillRect b="-17391"/>
+                    </a:stretch>
+                  </a:blipFill>
+                </p:spPr>
+                <p:txBody>
+                  <a:bodyPr/>
+                  <a:lstStyle/>
+                  <a:p>
+                    <a:r>
+                      <a:rPr lang="en-US">
+                        <a:noFill/>
+                      </a:rPr>
+                      <a:t> </a:t>
+                    </a:r>
+                  </a:p>
+                </p:txBody>
+              </p:sp>
+            </mc:Fallback>
+          </mc:AlternateContent>
+        </p:grpSp>
+      </p:grpSp>
     </p:spTree>
     <p:extLst>
       <p:ext uri="{BB962C8B-B14F-4D97-AF65-F5344CB8AC3E}">

</xml_diff>